<commit_message>
Major changes to the report, created a possible cover page, changed the order of some of the methods in CargoSpace and Package
</commit_message>
<xml_diff>
--- a/Report, presentation and related stuff/Diagrams.pptx
+++ b/Report, presentation and related stuff/Diagrams.pptx
@@ -9,6 +9,7 @@
     <p:sldId id="258" r:id="rId3"/>
     <p:sldId id="259" r:id="rId4"/>
     <p:sldId id="257" r:id="rId5"/>
+    <p:sldId id="260" r:id="rId6"/>
   </p:sldIdLst>
   <p:sldSz cx="12192000" cy="6858000"/>
   <p:notesSz cx="6858000" cy="9144000"/>
@@ -246,7 +247,7 @@
           <a:p>
             <a:fld id="{D060CFD4-460E-499E-AAE4-F835448407CD}" type="datetimeFigureOut">
               <a:rPr lang="en-GB" smtClean="0"/>
-              <a:t>18/01/2016</a:t>
+              <a:t>20/01/2016</a:t>
             </a:fld>
             <a:endParaRPr lang="en-GB"/>
           </a:p>
@@ -288,7 +289,7 @@
           <a:p>
             <a:fld id="{E9C1800A-26D9-4346-9081-A6D5929973D0}" type="slidenum">
               <a:rPr lang="en-GB" smtClean="0"/>
-              <a:t>‹#›</a:t>
+              <a:t>‹Nr.›</a:t>
             </a:fld>
             <a:endParaRPr lang="en-GB"/>
           </a:p>
@@ -416,7 +417,7 @@
           <a:p>
             <a:fld id="{D060CFD4-460E-499E-AAE4-F835448407CD}" type="datetimeFigureOut">
               <a:rPr lang="en-GB" smtClean="0"/>
-              <a:t>18/01/2016</a:t>
+              <a:t>20/01/2016</a:t>
             </a:fld>
             <a:endParaRPr lang="en-GB"/>
           </a:p>
@@ -458,7 +459,7 @@
           <a:p>
             <a:fld id="{E9C1800A-26D9-4346-9081-A6D5929973D0}" type="slidenum">
               <a:rPr lang="en-GB" smtClean="0"/>
-              <a:t>‹#›</a:t>
+              <a:t>‹Nr.›</a:t>
             </a:fld>
             <a:endParaRPr lang="en-GB"/>
           </a:p>
@@ -596,7 +597,7 @@
           <a:p>
             <a:fld id="{D060CFD4-460E-499E-AAE4-F835448407CD}" type="datetimeFigureOut">
               <a:rPr lang="en-GB" smtClean="0"/>
-              <a:t>18/01/2016</a:t>
+              <a:t>20/01/2016</a:t>
             </a:fld>
             <a:endParaRPr lang="en-GB"/>
           </a:p>
@@ -638,7 +639,7 @@
           <a:p>
             <a:fld id="{E9C1800A-26D9-4346-9081-A6D5929973D0}" type="slidenum">
               <a:rPr lang="en-GB" smtClean="0"/>
-              <a:t>‹#›</a:t>
+              <a:t>‹Nr.›</a:t>
             </a:fld>
             <a:endParaRPr lang="en-GB"/>
           </a:p>
@@ -766,7 +767,7 @@
           <a:p>
             <a:fld id="{D060CFD4-460E-499E-AAE4-F835448407CD}" type="datetimeFigureOut">
               <a:rPr lang="en-GB" smtClean="0"/>
-              <a:t>18/01/2016</a:t>
+              <a:t>20/01/2016</a:t>
             </a:fld>
             <a:endParaRPr lang="en-GB"/>
           </a:p>
@@ -808,7 +809,7 @@
           <a:p>
             <a:fld id="{E9C1800A-26D9-4346-9081-A6D5929973D0}" type="slidenum">
               <a:rPr lang="en-GB" smtClean="0"/>
-              <a:t>‹#›</a:t>
+              <a:t>‹Nr.›</a:t>
             </a:fld>
             <a:endParaRPr lang="en-GB"/>
           </a:p>
@@ -1012,7 +1013,7 @@
           <a:p>
             <a:fld id="{D060CFD4-460E-499E-AAE4-F835448407CD}" type="datetimeFigureOut">
               <a:rPr lang="en-GB" smtClean="0"/>
-              <a:t>18/01/2016</a:t>
+              <a:t>20/01/2016</a:t>
             </a:fld>
             <a:endParaRPr lang="en-GB"/>
           </a:p>
@@ -1054,7 +1055,7 @@
           <a:p>
             <a:fld id="{E9C1800A-26D9-4346-9081-A6D5929973D0}" type="slidenum">
               <a:rPr lang="en-GB" smtClean="0"/>
-              <a:t>‹#›</a:t>
+              <a:t>‹Nr.›</a:t>
             </a:fld>
             <a:endParaRPr lang="en-GB"/>
           </a:p>
@@ -1244,7 +1245,7 @@
           <a:p>
             <a:fld id="{D060CFD4-460E-499E-AAE4-F835448407CD}" type="datetimeFigureOut">
               <a:rPr lang="en-GB" smtClean="0"/>
-              <a:t>18/01/2016</a:t>
+              <a:t>20/01/2016</a:t>
             </a:fld>
             <a:endParaRPr lang="en-GB"/>
           </a:p>
@@ -1286,7 +1287,7 @@
           <a:p>
             <a:fld id="{E9C1800A-26D9-4346-9081-A6D5929973D0}" type="slidenum">
               <a:rPr lang="en-GB" smtClean="0"/>
-              <a:t>‹#›</a:t>
+              <a:t>‹Nr.›</a:t>
             </a:fld>
             <a:endParaRPr lang="en-GB"/>
           </a:p>
@@ -1611,7 +1612,7 @@
           <a:p>
             <a:fld id="{D060CFD4-460E-499E-AAE4-F835448407CD}" type="datetimeFigureOut">
               <a:rPr lang="en-GB" smtClean="0"/>
-              <a:t>18/01/2016</a:t>
+              <a:t>20/01/2016</a:t>
             </a:fld>
             <a:endParaRPr lang="en-GB"/>
           </a:p>
@@ -1653,7 +1654,7 @@
           <a:p>
             <a:fld id="{E9C1800A-26D9-4346-9081-A6D5929973D0}" type="slidenum">
               <a:rPr lang="en-GB" smtClean="0"/>
-              <a:t>‹#›</a:t>
+              <a:t>‹Nr.›</a:t>
             </a:fld>
             <a:endParaRPr lang="en-GB"/>
           </a:p>
@@ -1729,7 +1730,7 @@
           <a:p>
             <a:fld id="{D060CFD4-460E-499E-AAE4-F835448407CD}" type="datetimeFigureOut">
               <a:rPr lang="en-GB" smtClean="0"/>
-              <a:t>18/01/2016</a:t>
+              <a:t>20/01/2016</a:t>
             </a:fld>
             <a:endParaRPr lang="en-GB"/>
           </a:p>
@@ -1771,7 +1772,7 @@
           <a:p>
             <a:fld id="{E9C1800A-26D9-4346-9081-A6D5929973D0}" type="slidenum">
               <a:rPr lang="en-GB" smtClean="0"/>
-              <a:t>‹#›</a:t>
+              <a:t>‹Nr.›</a:t>
             </a:fld>
             <a:endParaRPr lang="en-GB"/>
           </a:p>
@@ -1824,7 +1825,7 @@
           <a:p>
             <a:fld id="{D060CFD4-460E-499E-AAE4-F835448407CD}" type="datetimeFigureOut">
               <a:rPr lang="en-GB" smtClean="0"/>
-              <a:t>18/01/2016</a:t>
+              <a:t>20/01/2016</a:t>
             </a:fld>
             <a:endParaRPr lang="en-GB"/>
           </a:p>
@@ -1866,7 +1867,7 @@
           <a:p>
             <a:fld id="{E9C1800A-26D9-4346-9081-A6D5929973D0}" type="slidenum">
               <a:rPr lang="en-GB" smtClean="0"/>
-              <a:t>‹#›</a:t>
+              <a:t>‹Nr.›</a:t>
             </a:fld>
             <a:endParaRPr lang="en-GB"/>
           </a:p>
@@ -2101,7 +2102,7 @@
           <a:p>
             <a:fld id="{D060CFD4-460E-499E-AAE4-F835448407CD}" type="datetimeFigureOut">
               <a:rPr lang="en-GB" smtClean="0"/>
-              <a:t>18/01/2016</a:t>
+              <a:t>20/01/2016</a:t>
             </a:fld>
             <a:endParaRPr lang="en-GB"/>
           </a:p>
@@ -2143,7 +2144,7 @@
           <a:p>
             <a:fld id="{E9C1800A-26D9-4346-9081-A6D5929973D0}" type="slidenum">
               <a:rPr lang="en-GB" smtClean="0"/>
-              <a:t>‹#›</a:t>
+              <a:t>‹Nr.›</a:t>
             </a:fld>
             <a:endParaRPr lang="en-GB"/>
           </a:p>
@@ -2354,7 +2355,7 @@
           <a:p>
             <a:fld id="{D060CFD4-460E-499E-AAE4-F835448407CD}" type="datetimeFigureOut">
               <a:rPr lang="en-GB" smtClean="0"/>
-              <a:t>18/01/2016</a:t>
+              <a:t>20/01/2016</a:t>
             </a:fld>
             <a:endParaRPr lang="en-GB"/>
           </a:p>
@@ -2396,7 +2397,7 @@
           <a:p>
             <a:fld id="{E9C1800A-26D9-4346-9081-A6D5929973D0}" type="slidenum">
               <a:rPr lang="en-GB" smtClean="0"/>
-              <a:t>‹#›</a:t>
+              <a:t>‹Nr.›</a:t>
             </a:fld>
             <a:endParaRPr lang="en-GB"/>
           </a:p>
@@ -2567,7 +2568,7 @@
           <a:p>
             <a:fld id="{D060CFD4-460E-499E-AAE4-F835448407CD}" type="datetimeFigureOut">
               <a:rPr lang="en-GB" smtClean="0"/>
-              <a:t>18/01/2016</a:t>
+              <a:t>20/01/2016</a:t>
             </a:fld>
             <a:endParaRPr lang="en-GB"/>
           </a:p>
@@ -2645,7 +2646,7 @@
           <a:p>
             <a:fld id="{E9C1800A-26D9-4346-9081-A6D5929973D0}" type="slidenum">
               <a:rPr lang="en-GB" smtClean="0"/>
-              <a:t>‹#›</a:t>
+              <a:t>‹Nr.›</a:t>
             </a:fld>
             <a:endParaRPr lang="en-GB"/>
           </a:p>
@@ -3129,7 +3130,7 @@
           <a:solidFill>
             <a:schemeClr val="bg1"/>
           </a:solidFill>
-          <a:ln>
+          <a:ln w="12700">
             <a:solidFill>
               <a:schemeClr val="tx1"/>
             </a:solidFill>
@@ -3492,7 +3493,7 @@
           </a:xfrm>
           <a:prstGeom prst="bentConnector3">
             <a:avLst>
-              <a:gd name="adj1" fmla="val -25703023"/>
+              <a:gd name="adj1" fmla="val -14435239"/>
             </a:avLst>
           </a:prstGeom>
           <a:ln w="12700">
@@ -3648,7 +3649,7 @@
           </a:xfrm>
           <a:prstGeom prst="bentConnector3">
             <a:avLst>
-              <a:gd name="adj1" fmla="val -16172130"/>
+              <a:gd name="adj1" fmla="val -7783892"/>
             </a:avLst>
           </a:prstGeom>
           <a:ln w="12700">
@@ -3732,7 +3733,7 @@
               <a:gd name="adj1" fmla="val 50000"/>
             </a:avLst>
           </a:prstGeom>
-          <a:ln>
+          <a:ln w="12700">
             <a:solidFill>
               <a:schemeClr val="tx1"/>
             </a:solidFill>
@@ -3811,6 +3812,214 @@
           <a:xfrm flipH="1">
             <a:off x="2828197" y="3900213"/>
             <a:ext cx="383722" cy="0"/>
+          </a:xfrm>
+          <a:prstGeom prst="straightConnector1">
+            <a:avLst/>
+          </a:prstGeom>
+          <a:ln w="12700">
+            <a:solidFill>
+              <a:schemeClr val="tx1"/>
+            </a:solidFill>
+            <a:prstDash val="dash"/>
+            <a:tailEnd type="arrow" w="lg" len="lg"/>
+          </a:ln>
+        </p:spPr>
+        <p:style>
+          <a:lnRef idx="1">
+            <a:schemeClr val="accent1"/>
+          </a:lnRef>
+          <a:fillRef idx="0">
+            <a:schemeClr val="accent1"/>
+          </a:fillRef>
+          <a:effectRef idx="0">
+            <a:schemeClr val="accent1"/>
+          </a:effectRef>
+          <a:fontRef idx="minor">
+            <a:schemeClr val="tx1"/>
+          </a:fontRef>
+        </p:style>
+      </p:cxnSp>
+      <p:sp>
+        <p:nvSpPr>
+          <p:cNvPr id="23" name="Rechteck 9"/>
+          <p:cNvSpPr/>
+          <p:nvPr/>
+        </p:nvSpPr>
+        <p:spPr>
+          <a:xfrm>
+            <a:off x="2416422" y="1633219"/>
+            <a:ext cx="1440000" cy="900000"/>
+          </a:xfrm>
+          <a:prstGeom prst="rect">
+            <a:avLst/>
+          </a:prstGeom>
+          <a:solidFill>
+            <a:schemeClr val="bg1"/>
+          </a:solidFill>
+          <a:ln>
+            <a:solidFill>
+              <a:schemeClr val="tx1"/>
+            </a:solidFill>
+          </a:ln>
+        </p:spPr>
+        <p:style>
+          <a:lnRef idx="2">
+            <a:schemeClr val="accent1">
+              <a:shade val="50000"/>
+            </a:schemeClr>
+          </a:lnRef>
+          <a:fillRef idx="1">
+            <a:schemeClr val="accent1"/>
+          </a:fillRef>
+          <a:effectRef idx="0">
+            <a:schemeClr val="accent1"/>
+          </a:effectRef>
+          <a:fontRef idx="minor">
+            <a:schemeClr val="lt1"/>
+          </a:fontRef>
+        </p:style>
+        <p:txBody>
+          <a:bodyPr rtlCol="0" anchor="ctr"/>
+          <a:lstStyle/>
+          <a:p>
+            <a:pPr algn="ctr"/>
+            <a:r>
+              <a:rPr lang="en-GB" dirty="0" err="1" smtClean="0">
+                <a:solidFill>
+                  <a:schemeClr val="tx1"/>
+                </a:solidFill>
+                <a:latin typeface="Arial" panose="020B0604020202020204" pitchFamily="34" charset="0"/>
+                <a:cs typeface="Arial" panose="020B0604020202020204" pitchFamily="34" charset="0"/>
+              </a:rPr>
+              <a:t>MainFrame</a:t>
+            </a:r>
+            <a:endParaRPr lang="en-GB" dirty="0" smtClean="0">
+              <a:solidFill>
+                <a:schemeClr val="tx1"/>
+              </a:solidFill>
+              <a:latin typeface="Arial" panose="020B0604020202020204" pitchFamily="34" charset="0"/>
+              <a:cs typeface="Arial" panose="020B0604020202020204" pitchFamily="34" charset="0"/>
+            </a:endParaRPr>
+          </a:p>
+        </p:txBody>
+      </p:sp>
+      <p:sp>
+        <p:nvSpPr>
+          <p:cNvPr id="25" name="Rechteck 9"/>
+          <p:cNvSpPr/>
+          <p:nvPr/>
+        </p:nvSpPr>
+        <p:spPr>
+          <a:xfrm>
+            <a:off x="7654857" y="1656562"/>
+            <a:ext cx="1440000" cy="900000"/>
+          </a:xfrm>
+          <a:prstGeom prst="rect">
+            <a:avLst/>
+          </a:prstGeom>
+          <a:solidFill>
+            <a:schemeClr val="bg1"/>
+          </a:solidFill>
+          <a:ln>
+            <a:solidFill>
+              <a:schemeClr val="tx1"/>
+            </a:solidFill>
+          </a:ln>
+        </p:spPr>
+        <p:style>
+          <a:lnRef idx="2">
+            <a:schemeClr val="accent1">
+              <a:shade val="50000"/>
+            </a:schemeClr>
+          </a:lnRef>
+          <a:fillRef idx="1">
+            <a:schemeClr val="accent1"/>
+          </a:fillRef>
+          <a:effectRef idx="0">
+            <a:schemeClr val="accent1"/>
+          </a:effectRef>
+          <a:fontRef idx="minor">
+            <a:schemeClr val="lt1"/>
+          </a:fontRef>
+        </p:style>
+        <p:txBody>
+          <a:bodyPr rtlCol="0" anchor="ctr"/>
+          <a:lstStyle/>
+          <a:p>
+            <a:pPr algn="ctr"/>
+            <a:r>
+              <a:rPr lang="en-GB" dirty="0" smtClean="0">
+                <a:solidFill>
+                  <a:schemeClr val="tx1"/>
+                </a:solidFill>
+                <a:latin typeface="Arial" panose="020B0604020202020204" pitchFamily="34" charset="0"/>
+                <a:cs typeface="Arial" panose="020B0604020202020204" pitchFamily="34" charset="0"/>
+              </a:rPr>
+              <a:t>Display3D</a:t>
+            </a:r>
+            <a:endParaRPr lang="en-GB" dirty="0" smtClean="0">
+              <a:solidFill>
+                <a:schemeClr val="tx1"/>
+              </a:solidFill>
+              <a:latin typeface="Arial" panose="020B0604020202020204" pitchFamily="34" charset="0"/>
+              <a:cs typeface="Arial" panose="020B0604020202020204" pitchFamily="34" charset="0"/>
+            </a:endParaRPr>
+          </a:p>
+        </p:txBody>
+      </p:sp>
+      <p:cxnSp>
+        <p:nvCxnSpPr>
+          <p:cNvPr id="26" name="Gerade Verbindung mit Pfeil 18"/>
+          <p:cNvCxnSpPr>
+            <a:stCxn id="5" idx="3"/>
+            <a:endCxn id="25" idx="1"/>
+          </p:cNvCxnSpPr>
+          <p:nvPr/>
+        </p:nvCxnSpPr>
+        <p:spPr>
+          <a:xfrm>
+            <a:off x="6475640" y="2100213"/>
+            <a:ext cx="1179217" cy="6349"/>
+          </a:xfrm>
+          <a:prstGeom prst="straightConnector1">
+            <a:avLst/>
+          </a:prstGeom>
+          <a:ln w="12700">
+            <a:solidFill>
+              <a:schemeClr val="tx1"/>
+            </a:solidFill>
+            <a:prstDash val="dash"/>
+            <a:tailEnd type="arrow" w="lg" len="lg"/>
+          </a:ln>
+        </p:spPr>
+        <p:style>
+          <a:lnRef idx="1">
+            <a:schemeClr val="accent1"/>
+          </a:lnRef>
+          <a:fillRef idx="0">
+            <a:schemeClr val="accent1"/>
+          </a:fillRef>
+          <a:effectRef idx="0">
+            <a:schemeClr val="accent1"/>
+          </a:effectRef>
+          <a:fontRef idx="minor">
+            <a:schemeClr val="tx1"/>
+          </a:fontRef>
+        </p:style>
+      </p:cxnSp>
+      <p:cxnSp>
+        <p:nvCxnSpPr>
+          <p:cNvPr id="27" name="Gerade Verbindung mit Pfeil 18"/>
+          <p:cNvCxnSpPr>
+            <a:stCxn id="23" idx="3"/>
+            <a:endCxn id="5" idx="1"/>
+          </p:cNvCxnSpPr>
+          <p:nvPr/>
+        </p:nvCxnSpPr>
+        <p:spPr>
+          <a:xfrm>
+            <a:off x="3856422" y="2083219"/>
+            <a:ext cx="1179218" cy="16994"/>
           </a:xfrm>
           <a:prstGeom prst="straightConnector1">
             <a:avLst/>
@@ -3968,16 +4177,6 @@
               </a:rPr>
               <a:t>Greedy</a:t>
             </a:r>
-            <a:r>
-              <a:rPr lang="en-GB" dirty="0" smtClean="0">
-                <a:solidFill>
-                  <a:schemeClr val="tx1"/>
-                </a:solidFill>
-                <a:latin typeface="Arial" panose="020B0604020202020204" pitchFamily="34" charset="0"/>
-                <a:cs typeface="Arial" panose="020B0604020202020204" pitchFamily="34" charset="0"/>
-              </a:rPr>
-              <a:t/>
-            </a:r>
             <a:br>
               <a:rPr lang="en-GB" dirty="0" smtClean="0">
                 <a:solidFill>
@@ -4074,13 +4273,6 @@
               </a:rPr>
               <a:t>Space</a:t>
             </a:r>
-            <a:endParaRPr lang="en-GB" dirty="0" smtClean="0">
-              <a:solidFill>
-                <a:schemeClr val="tx1"/>
-              </a:solidFill>
-              <a:latin typeface="Arial" panose="020B0604020202020204" pitchFamily="34" charset="0"/>
-              <a:cs typeface="Arial" panose="020B0604020202020204" pitchFamily="34" charset="0"/>
-            </a:endParaRPr>
           </a:p>
         </p:txBody>
       </p:sp>
@@ -4195,13 +4387,6 @@
               </a:rPr>
               <a:t>Random</a:t>
             </a:r>
-            <a:endParaRPr lang="en-GB" dirty="0" smtClean="0">
-              <a:solidFill>
-                <a:schemeClr val="tx1"/>
-              </a:solidFill>
-              <a:latin typeface="Arial" panose="020B0604020202020204" pitchFamily="34" charset="0"/>
-              <a:cs typeface="Arial" panose="020B0604020202020204" pitchFamily="34" charset="0"/>
-            </a:endParaRPr>
           </a:p>
         </p:txBody>
       </p:sp>
@@ -4343,6 +4528,214 @@
             <a:avLst>
               <a:gd name="adj1" fmla="val 50000"/>
             </a:avLst>
+          </a:prstGeom>
+          <a:ln w="12700">
+            <a:solidFill>
+              <a:schemeClr val="tx1"/>
+            </a:solidFill>
+            <a:prstDash val="dash"/>
+            <a:tailEnd type="arrow" w="lg" len="lg"/>
+          </a:ln>
+        </p:spPr>
+        <p:style>
+          <a:lnRef idx="1">
+            <a:schemeClr val="accent1"/>
+          </a:lnRef>
+          <a:fillRef idx="0">
+            <a:schemeClr val="accent1"/>
+          </a:fillRef>
+          <a:effectRef idx="0">
+            <a:schemeClr val="accent1"/>
+          </a:effectRef>
+          <a:fontRef idx="minor">
+            <a:schemeClr val="tx1"/>
+          </a:fontRef>
+        </p:style>
+      </p:cxnSp>
+      <p:sp>
+        <p:nvSpPr>
+          <p:cNvPr id="11" name="Rechteck 9"/>
+          <p:cNvSpPr/>
+          <p:nvPr/>
+        </p:nvSpPr>
+        <p:spPr>
+          <a:xfrm>
+            <a:off x="2619158" y="1414006"/>
+            <a:ext cx="1440000" cy="900000"/>
+          </a:xfrm>
+          <a:prstGeom prst="rect">
+            <a:avLst/>
+          </a:prstGeom>
+          <a:solidFill>
+            <a:schemeClr val="bg1"/>
+          </a:solidFill>
+          <a:ln>
+            <a:solidFill>
+              <a:schemeClr val="tx1"/>
+            </a:solidFill>
+          </a:ln>
+        </p:spPr>
+        <p:style>
+          <a:lnRef idx="2">
+            <a:schemeClr val="accent1">
+              <a:shade val="50000"/>
+            </a:schemeClr>
+          </a:lnRef>
+          <a:fillRef idx="1">
+            <a:schemeClr val="accent1"/>
+          </a:fillRef>
+          <a:effectRef idx="0">
+            <a:schemeClr val="accent1"/>
+          </a:effectRef>
+          <a:fontRef idx="minor">
+            <a:schemeClr val="lt1"/>
+          </a:fontRef>
+        </p:style>
+        <p:txBody>
+          <a:bodyPr rtlCol="0" anchor="ctr"/>
+          <a:lstStyle/>
+          <a:p>
+            <a:pPr algn="ctr"/>
+            <a:r>
+              <a:rPr lang="en-GB" dirty="0" err="1" smtClean="0">
+                <a:solidFill>
+                  <a:schemeClr val="tx1"/>
+                </a:solidFill>
+                <a:latin typeface="Arial" panose="020B0604020202020204" pitchFamily="34" charset="0"/>
+                <a:cs typeface="Arial" panose="020B0604020202020204" pitchFamily="34" charset="0"/>
+              </a:rPr>
+              <a:t>MainFrame</a:t>
+            </a:r>
+            <a:endParaRPr lang="en-GB" dirty="0" smtClean="0">
+              <a:solidFill>
+                <a:schemeClr val="tx1"/>
+              </a:solidFill>
+              <a:latin typeface="Arial" panose="020B0604020202020204" pitchFamily="34" charset="0"/>
+              <a:cs typeface="Arial" panose="020B0604020202020204" pitchFamily="34" charset="0"/>
+            </a:endParaRPr>
+          </a:p>
+        </p:txBody>
+      </p:sp>
+      <p:sp>
+        <p:nvSpPr>
+          <p:cNvPr id="12" name="Rechteck 9"/>
+          <p:cNvSpPr/>
+          <p:nvPr/>
+        </p:nvSpPr>
+        <p:spPr>
+          <a:xfrm>
+            <a:off x="8039072" y="1414006"/>
+            <a:ext cx="1440000" cy="900000"/>
+          </a:xfrm>
+          <a:prstGeom prst="rect">
+            <a:avLst/>
+          </a:prstGeom>
+          <a:solidFill>
+            <a:schemeClr val="bg1"/>
+          </a:solidFill>
+          <a:ln>
+            <a:solidFill>
+              <a:schemeClr val="tx1"/>
+            </a:solidFill>
+          </a:ln>
+        </p:spPr>
+        <p:style>
+          <a:lnRef idx="2">
+            <a:schemeClr val="accent1">
+              <a:shade val="50000"/>
+            </a:schemeClr>
+          </a:lnRef>
+          <a:fillRef idx="1">
+            <a:schemeClr val="accent1"/>
+          </a:fillRef>
+          <a:effectRef idx="0">
+            <a:schemeClr val="accent1"/>
+          </a:effectRef>
+          <a:fontRef idx="minor">
+            <a:schemeClr val="lt1"/>
+          </a:fontRef>
+        </p:style>
+        <p:txBody>
+          <a:bodyPr rtlCol="0" anchor="ctr"/>
+          <a:lstStyle/>
+          <a:p>
+            <a:pPr algn="ctr"/>
+            <a:r>
+              <a:rPr lang="en-GB" dirty="0" smtClean="0">
+                <a:solidFill>
+                  <a:schemeClr val="tx1"/>
+                </a:solidFill>
+                <a:latin typeface="Arial" panose="020B0604020202020204" pitchFamily="34" charset="0"/>
+                <a:cs typeface="Arial" panose="020B0604020202020204" pitchFamily="34" charset="0"/>
+              </a:rPr>
+              <a:t>Display3D</a:t>
+            </a:r>
+            <a:endParaRPr lang="en-GB" dirty="0" smtClean="0">
+              <a:solidFill>
+                <a:schemeClr val="tx1"/>
+              </a:solidFill>
+              <a:latin typeface="Arial" panose="020B0604020202020204" pitchFamily="34" charset="0"/>
+              <a:cs typeface="Arial" panose="020B0604020202020204" pitchFamily="34" charset="0"/>
+            </a:endParaRPr>
+          </a:p>
+        </p:txBody>
+      </p:sp>
+      <p:cxnSp>
+        <p:nvCxnSpPr>
+          <p:cNvPr id="14" name="Gerade Verbindung mit Pfeil 18"/>
+          <p:cNvCxnSpPr>
+            <a:stCxn id="11" idx="3"/>
+            <a:endCxn id="4" idx="1"/>
+          </p:cNvCxnSpPr>
+          <p:nvPr/>
+        </p:nvCxnSpPr>
+        <p:spPr>
+          <a:xfrm>
+            <a:off x="4059158" y="1864006"/>
+            <a:ext cx="1269957" cy="3"/>
+          </a:xfrm>
+          <a:prstGeom prst="straightConnector1">
+            <a:avLst/>
+          </a:prstGeom>
+          <a:ln w="12700">
+            <a:solidFill>
+              <a:schemeClr val="tx1"/>
+            </a:solidFill>
+            <a:prstDash val="dash"/>
+            <a:tailEnd type="arrow" w="lg" len="lg"/>
+          </a:ln>
+        </p:spPr>
+        <p:style>
+          <a:lnRef idx="1">
+            <a:schemeClr val="accent1"/>
+          </a:lnRef>
+          <a:fillRef idx="0">
+            <a:schemeClr val="accent1"/>
+          </a:fillRef>
+          <a:effectRef idx="0">
+            <a:schemeClr val="accent1"/>
+          </a:effectRef>
+          <a:fontRef idx="minor">
+            <a:schemeClr val="tx1"/>
+          </a:fontRef>
+        </p:style>
+      </p:cxnSp>
+      <p:cxnSp>
+        <p:nvCxnSpPr>
+          <p:cNvPr id="16" name="Gerade Verbindung mit Pfeil 18"/>
+          <p:cNvCxnSpPr>
+            <a:stCxn id="4" idx="3"/>
+            <a:endCxn id="12" idx="1"/>
+          </p:cNvCxnSpPr>
+          <p:nvPr/>
+        </p:nvCxnSpPr>
+        <p:spPr>
+          <a:xfrm flipV="1">
+            <a:off x="6769115" y="1864006"/>
+            <a:ext cx="1269957" cy="3"/>
+          </a:xfrm>
+          <a:prstGeom prst="straightConnector1">
+            <a:avLst/>
           </a:prstGeom>
           <a:ln w="12700">
             <a:solidFill>
@@ -4574,13 +4967,6 @@
               </a:rPr>
               <a:t>Space</a:t>
             </a:r>
-            <a:endParaRPr lang="en-GB" dirty="0" smtClean="0">
-              <a:solidFill>
-                <a:schemeClr val="tx1"/>
-              </a:solidFill>
-              <a:latin typeface="Arial" panose="020B0604020202020204" pitchFamily="34" charset="0"/>
-              <a:cs typeface="Arial" panose="020B0604020202020204" pitchFamily="34" charset="0"/>
-            </a:endParaRPr>
           </a:p>
         </p:txBody>
       </p:sp>
@@ -4845,7 +5231,7 @@
               <a:gd name="adj1" fmla="val 50000"/>
             </a:avLst>
           </a:prstGeom>
-          <a:ln>
+          <a:ln w="12700">
             <a:solidFill>
               <a:schemeClr val="tx1"/>
             </a:solidFill>
@@ -4922,13 +5308,6 @@
               </a:rPr>
               <a:t>Random</a:t>
             </a:r>
-            <a:endParaRPr lang="en-GB" dirty="0" smtClean="0">
-              <a:solidFill>
-                <a:schemeClr val="tx1"/>
-              </a:solidFill>
-              <a:latin typeface="Arial" panose="020B0604020202020204" pitchFamily="34" charset="0"/>
-              <a:cs typeface="Arial" panose="020B0604020202020204" pitchFamily="34" charset="0"/>
-            </a:endParaRPr>
           </a:p>
         </p:txBody>
       </p:sp>
@@ -5029,6 +5408,214 @@
             <a:ext cx="1448994" cy="1544248"/>
           </a:xfrm>
           <a:prstGeom prst="bentConnector3">
+            <a:avLst/>
+          </a:prstGeom>
+          <a:ln w="12700">
+            <a:solidFill>
+              <a:schemeClr val="tx1"/>
+            </a:solidFill>
+            <a:prstDash val="dash"/>
+            <a:tailEnd type="arrow" w="lg" len="lg"/>
+          </a:ln>
+        </p:spPr>
+        <p:style>
+          <a:lnRef idx="1">
+            <a:schemeClr val="accent1"/>
+          </a:lnRef>
+          <a:fillRef idx="0">
+            <a:schemeClr val="accent1"/>
+          </a:fillRef>
+          <a:effectRef idx="0">
+            <a:schemeClr val="accent1"/>
+          </a:effectRef>
+          <a:fontRef idx="minor">
+            <a:schemeClr val="tx1"/>
+          </a:fontRef>
+        </p:style>
+      </p:cxnSp>
+      <p:sp>
+        <p:nvSpPr>
+          <p:cNvPr id="18" name="Rechteck 9"/>
+          <p:cNvSpPr/>
+          <p:nvPr/>
+        </p:nvSpPr>
+        <p:spPr>
+          <a:xfrm>
+            <a:off x="2444181" y="2388558"/>
+            <a:ext cx="1440000" cy="900000"/>
+          </a:xfrm>
+          <a:prstGeom prst="rect">
+            <a:avLst/>
+          </a:prstGeom>
+          <a:solidFill>
+            <a:schemeClr val="bg1"/>
+          </a:solidFill>
+          <a:ln>
+            <a:solidFill>
+              <a:schemeClr val="tx1"/>
+            </a:solidFill>
+          </a:ln>
+        </p:spPr>
+        <p:style>
+          <a:lnRef idx="2">
+            <a:schemeClr val="accent1">
+              <a:shade val="50000"/>
+            </a:schemeClr>
+          </a:lnRef>
+          <a:fillRef idx="1">
+            <a:schemeClr val="accent1"/>
+          </a:fillRef>
+          <a:effectRef idx="0">
+            <a:schemeClr val="accent1"/>
+          </a:effectRef>
+          <a:fontRef idx="minor">
+            <a:schemeClr val="lt1"/>
+          </a:fontRef>
+        </p:style>
+        <p:txBody>
+          <a:bodyPr rtlCol="0" anchor="ctr"/>
+          <a:lstStyle/>
+          <a:p>
+            <a:pPr algn="ctr"/>
+            <a:r>
+              <a:rPr lang="en-GB" dirty="0" err="1" smtClean="0">
+                <a:solidFill>
+                  <a:schemeClr val="tx1"/>
+                </a:solidFill>
+                <a:latin typeface="Arial" panose="020B0604020202020204" pitchFamily="34" charset="0"/>
+                <a:cs typeface="Arial" panose="020B0604020202020204" pitchFamily="34" charset="0"/>
+              </a:rPr>
+              <a:t>MainFrame</a:t>
+            </a:r>
+            <a:endParaRPr lang="en-GB" dirty="0" smtClean="0">
+              <a:solidFill>
+                <a:schemeClr val="tx1"/>
+              </a:solidFill>
+              <a:latin typeface="Arial" panose="020B0604020202020204" pitchFamily="34" charset="0"/>
+              <a:cs typeface="Arial" panose="020B0604020202020204" pitchFamily="34" charset="0"/>
+            </a:endParaRPr>
+          </a:p>
+        </p:txBody>
+      </p:sp>
+      <p:sp>
+        <p:nvSpPr>
+          <p:cNvPr id="19" name="Rechteck 9"/>
+          <p:cNvSpPr/>
+          <p:nvPr/>
+        </p:nvSpPr>
+        <p:spPr>
+          <a:xfrm>
+            <a:off x="7915945" y="2388558"/>
+            <a:ext cx="1440000" cy="900000"/>
+          </a:xfrm>
+          <a:prstGeom prst="rect">
+            <a:avLst/>
+          </a:prstGeom>
+          <a:solidFill>
+            <a:schemeClr val="bg1"/>
+          </a:solidFill>
+          <a:ln>
+            <a:solidFill>
+              <a:schemeClr val="tx1"/>
+            </a:solidFill>
+          </a:ln>
+        </p:spPr>
+        <p:style>
+          <a:lnRef idx="2">
+            <a:schemeClr val="accent1">
+              <a:shade val="50000"/>
+            </a:schemeClr>
+          </a:lnRef>
+          <a:fillRef idx="1">
+            <a:schemeClr val="accent1"/>
+          </a:fillRef>
+          <a:effectRef idx="0">
+            <a:schemeClr val="accent1"/>
+          </a:effectRef>
+          <a:fontRef idx="minor">
+            <a:schemeClr val="lt1"/>
+          </a:fontRef>
+        </p:style>
+        <p:txBody>
+          <a:bodyPr rtlCol="0" anchor="ctr"/>
+          <a:lstStyle/>
+          <a:p>
+            <a:pPr algn="ctr"/>
+            <a:r>
+              <a:rPr lang="en-GB" dirty="0" smtClean="0">
+                <a:solidFill>
+                  <a:schemeClr val="tx1"/>
+                </a:solidFill>
+                <a:latin typeface="Arial" panose="020B0604020202020204" pitchFamily="34" charset="0"/>
+                <a:cs typeface="Arial" panose="020B0604020202020204" pitchFamily="34" charset="0"/>
+              </a:rPr>
+              <a:t>Display3D</a:t>
+            </a:r>
+            <a:endParaRPr lang="en-GB" dirty="0" smtClean="0">
+              <a:solidFill>
+                <a:schemeClr val="tx1"/>
+              </a:solidFill>
+              <a:latin typeface="Arial" panose="020B0604020202020204" pitchFamily="34" charset="0"/>
+              <a:cs typeface="Arial" panose="020B0604020202020204" pitchFamily="34" charset="0"/>
+            </a:endParaRPr>
+          </a:p>
+        </p:txBody>
+      </p:sp>
+      <p:cxnSp>
+        <p:nvCxnSpPr>
+          <p:cNvPr id="20" name="Gerade Verbindung mit Pfeil 18"/>
+          <p:cNvCxnSpPr>
+            <a:stCxn id="18" idx="3"/>
+            <a:endCxn id="3" idx="1"/>
+          </p:cNvCxnSpPr>
+          <p:nvPr/>
+        </p:nvCxnSpPr>
+        <p:spPr>
+          <a:xfrm>
+            <a:off x="3884181" y="2838558"/>
+            <a:ext cx="1295882" cy="2"/>
+          </a:xfrm>
+          <a:prstGeom prst="straightConnector1">
+            <a:avLst/>
+          </a:prstGeom>
+          <a:ln w="12700">
+            <a:solidFill>
+              <a:schemeClr val="tx1"/>
+            </a:solidFill>
+            <a:prstDash val="dash"/>
+            <a:tailEnd type="arrow" w="lg" len="lg"/>
+          </a:ln>
+        </p:spPr>
+        <p:style>
+          <a:lnRef idx="1">
+            <a:schemeClr val="accent1"/>
+          </a:lnRef>
+          <a:fillRef idx="0">
+            <a:schemeClr val="accent1"/>
+          </a:fillRef>
+          <a:effectRef idx="0">
+            <a:schemeClr val="accent1"/>
+          </a:effectRef>
+          <a:fontRef idx="minor">
+            <a:schemeClr val="tx1"/>
+          </a:fontRef>
+        </p:style>
+      </p:cxnSp>
+      <p:cxnSp>
+        <p:nvCxnSpPr>
+          <p:cNvPr id="22" name="Gerade Verbindung mit Pfeil 18"/>
+          <p:cNvCxnSpPr>
+            <a:stCxn id="3" idx="3"/>
+            <a:endCxn id="19" idx="1"/>
+          </p:cNvCxnSpPr>
+          <p:nvPr/>
+        </p:nvCxnSpPr>
+        <p:spPr>
+          <a:xfrm flipV="1">
+            <a:off x="6620063" y="2838558"/>
+            <a:ext cx="1295882" cy="2"/>
+          </a:xfrm>
+          <a:prstGeom prst="straightConnector1">
             <a:avLst/>
           </a:prstGeom>
           <a:ln w="12700">
@@ -6550,7 +7137,7 @@
           <a:prstGeom prst="bentConnector3">
             <a:avLst/>
           </a:prstGeom>
-          <a:ln>
+          <a:ln w="12700">
             <a:solidFill>
               <a:schemeClr val="tx1"/>
             </a:solidFill>
@@ -6590,7 +7177,7 @@
           <a:prstGeom prst="bentConnector3">
             <a:avLst/>
           </a:prstGeom>
-          <a:ln>
+          <a:ln w="12700">
             <a:solidFill>
               <a:schemeClr val="tx1"/>
             </a:solidFill>
@@ -6767,6 +7354,2380 @@
     <p:extLst>
       <p:ext uri="{BB962C8B-B14F-4D97-AF65-F5344CB8AC3E}">
         <p14:creationId xmlns:p14="http://schemas.microsoft.com/office/powerpoint/2010/main" val="1346064591"/>
+      </p:ext>
+    </p:extLst>
+  </p:cSld>
+  <p:clrMapOvr>
+    <a:masterClrMapping/>
+  </p:clrMapOvr>
+</p:sld>
+</file>
+
+<file path=ppt/slides/slide5.xml><?xml version="1.0" encoding="utf-8"?>
+<p:sld xmlns:a="http://schemas.openxmlformats.org/drawingml/2006/main" xmlns:r="http://schemas.openxmlformats.org/officeDocument/2006/relationships" xmlns:p="http://schemas.openxmlformats.org/presentationml/2006/main">
+  <p:cSld>
+    <p:spTree>
+      <p:nvGrpSpPr>
+        <p:cNvPr id="1" name=""/>
+        <p:cNvGrpSpPr/>
+        <p:nvPr/>
+      </p:nvGrpSpPr>
+      <p:grpSpPr>
+        <a:xfrm>
+          <a:off x="0" y="0"/>
+          <a:ext cx="0" cy="0"/>
+          <a:chOff x="0" y="0"/>
+          <a:chExt cx="0" cy="0"/>
+        </a:xfrm>
+      </p:grpSpPr>
+      <p:sp>
+        <p:nvSpPr>
+          <p:cNvPr id="9" name="Rechteck 8"/>
+          <p:cNvSpPr/>
+          <p:nvPr/>
+        </p:nvSpPr>
+        <p:spPr>
+          <a:xfrm>
+            <a:off x="5255811" y="3329407"/>
+            <a:ext cx="1614115" cy="850789"/>
+          </a:xfrm>
+          <a:prstGeom prst="rect">
+            <a:avLst/>
+          </a:prstGeom>
+          <a:solidFill>
+            <a:schemeClr val="bg1"/>
+          </a:solidFill>
+          <a:ln>
+            <a:noFill/>
+          </a:ln>
+        </p:spPr>
+        <p:style>
+          <a:lnRef idx="2">
+            <a:schemeClr val="accent1">
+              <a:shade val="50000"/>
+            </a:schemeClr>
+          </a:lnRef>
+          <a:fillRef idx="1">
+            <a:schemeClr val="accent1"/>
+          </a:fillRef>
+          <a:effectRef idx="0">
+            <a:schemeClr val="accent1"/>
+          </a:effectRef>
+          <a:fontRef idx="minor">
+            <a:schemeClr val="lt1"/>
+          </a:fontRef>
+        </p:style>
+        <p:txBody>
+          <a:bodyPr rtlCol="0" anchor="ctr"/>
+          <a:lstStyle/>
+          <a:p>
+            <a:pPr algn="ctr"/>
+            <a:endParaRPr lang="en-GB"/>
+          </a:p>
+        </p:txBody>
+      </p:sp>
+      <p:graphicFrame>
+        <p:nvGraphicFramePr>
+          <p:cNvPr id="8" name="Tabelle 7"/>
+          <p:cNvGraphicFramePr>
+            <a:graphicFrameLocks noGrp="1"/>
+          </p:cNvGraphicFramePr>
+          <p:nvPr>
+            <p:extLst>
+              <p:ext uri="{D42A27DB-BD31-4B8C-83A1-F6EECF244321}">
+                <p14:modId xmlns:p14="http://schemas.microsoft.com/office/powerpoint/2010/main" val="1319859692"/>
+              </p:ext>
+            </p:extLst>
+          </p:nvPr>
+        </p:nvGraphicFramePr>
+        <p:xfrm>
+          <a:off x="3622371" y="2692765"/>
+          <a:ext cx="4597401" cy="2124075"/>
+        </p:xfrm>
+        <a:graphic>
+          <a:graphicData uri="http://schemas.openxmlformats.org/drawingml/2006/table">
+            <a:tbl>
+              <a:tblPr/>
+              <a:tblGrid>
+                <a:gridCol w="294665"/>
+                <a:gridCol w="63369"/>
+                <a:gridCol w="66537"/>
+                <a:gridCol w="4172830"/>
+              </a:tblGrid>
+              <a:tr h="200025">
+                <a:tc>
+                  <a:txBody>
+                    <a:bodyPr/>
+                    <a:lstStyle/>
+                    <a:p>
+                      <a:pPr algn="r" fontAlgn="b"/>
+                      <a:r>
+                        <a:rPr lang="en-GB" sz="1100" b="0" i="0" u="none" strike="noStrike" dirty="0">
+                          <a:solidFill>
+                            <a:srgbClr val="000000"/>
+                          </a:solidFill>
+                          <a:effectLst/>
+                          <a:latin typeface="Arial" panose="020B0604020202020204" pitchFamily="34" charset="0"/>
+                        </a:rPr>
+                        <a:t>1</a:t>
+                      </a:r>
+                    </a:p>
+                  </a:txBody>
+                  <a:tcPr marL="9525" marR="9525" marT="9525" marB="0" anchor="b">
+                    <a:lnL w="12700" cap="flat" cmpd="sng" algn="ctr">
+                      <a:solidFill>
+                        <a:srgbClr val="000000"/>
+                      </a:solidFill>
+                      <a:prstDash val="solid"/>
+                      <a:round/>
+                      <a:headEnd type="none" w="med" len="med"/>
+                      <a:tailEnd type="none" w="med" len="med"/>
+                    </a:lnL>
+                    <a:lnR>
+                      <a:noFill/>
+                    </a:lnR>
+                    <a:lnT w="12700" cap="flat" cmpd="sng" algn="ctr">
+                      <a:solidFill>
+                        <a:srgbClr val="000000"/>
+                      </a:solidFill>
+                      <a:prstDash val="solid"/>
+                      <a:round/>
+                      <a:headEnd type="none" w="med" len="med"/>
+                      <a:tailEnd type="none" w="med" len="med"/>
+                    </a:lnT>
+                    <a:lnB w="6350" cap="flat" cmpd="sng" algn="ctr">
+                      <a:solidFill>
+                        <a:srgbClr val="000000"/>
+                      </a:solidFill>
+                      <a:prstDash val="solid"/>
+                      <a:round/>
+                      <a:headEnd type="none" w="med" len="med"/>
+                      <a:tailEnd type="none" w="med" len="med"/>
+                    </a:lnB>
+                  </a:tcPr>
+                </a:tc>
+                <a:tc>
+                  <a:txBody>
+                    <a:bodyPr/>
+                    <a:lstStyle/>
+                    <a:p>
+                      <a:pPr algn="l" fontAlgn="b"/>
+                      <a:r>
+                        <a:rPr lang="en-GB" sz="1100" b="0" i="0" u="none" strike="noStrike">
+                          <a:solidFill>
+                            <a:srgbClr val="000000"/>
+                          </a:solidFill>
+                          <a:effectLst/>
+                          <a:latin typeface="Arial" panose="020B0604020202020204" pitchFamily="34" charset="0"/>
+                        </a:rPr>
+                        <a:t> </a:t>
+                      </a:r>
+                    </a:p>
+                  </a:txBody>
+                  <a:tcPr marL="9525" marR="9525" marT="9525" marB="0" anchor="b">
+                    <a:lnL>
+                      <a:noFill/>
+                    </a:lnL>
+                    <a:lnR w="6350" cap="flat" cmpd="sng" algn="ctr">
+                      <a:solidFill>
+                        <a:srgbClr val="000000"/>
+                      </a:solidFill>
+                      <a:prstDash val="solid"/>
+                      <a:round/>
+                      <a:headEnd type="none" w="med" len="med"/>
+                      <a:tailEnd type="none" w="med" len="med"/>
+                    </a:lnR>
+                    <a:lnT w="12700" cap="flat" cmpd="sng" algn="ctr">
+                      <a:solidFill>
+                        <a:srgbClr val="000000"/>
+                      </a:solidFill>
+                      <a:prstDash val="solid"/>
+                      <a:round/>
+                      <a:headEnd type="none" w="med" len="med"/>
+                      <a:tailEnd type="none" w="med" len="med"/>
+                    </a:lnT>
+                    <a:lnB w="6350" cap="flat" cmpd="sng" algn="ctr">
+                      <a:solidFill>
+                        <a:srgbClr val="000000"/>
+                      </a:solidFill>
+                      <a:prstDash val="solid"/>
+                      <a:round/>
+                      <a:headEnd type="none" w="med" len="med"/>
+                      <a:tailEnd type="none" w="med" len="med"/>
+                    </a:lnB>
+                  </a:tcPr>
+                </a:tc>
+                <a:tc>
+                  <a:txBody>
+                    <a:bodyPr/>
+                    <a:lstStyle/>
+                    <a:p>
+                      <a:pPr algn="ctr" fontAlgn="b"/>
+                      <a:r>
+                        <a:rPr lang="en-GB" sz="1100" b="0" i="0" u="none" strike="noStrike">
+                          <a:solidFill>
+                            <a:srgbClr val="000000"/>
+                          </a:solidFill>
+                          <a:effectLst/>
+                          <a:latin typeface="Arial" panose="020B0604020202020204" pitchFamily="34" charset="0"/>
+                        </a:rPr>
+                        <a:t> </a:t>
+                      </a:r>
+                    </a:p>
+                  </a:txBody>
+                  <a:tcPr marL="9525" marR="9525" marT="9525" marB="0" anchor="b">
+                    <a:lnL w="6350" cap="flat" cmpd="sng" algn="ctr">
+                      <a:solidFill>
+                        <a:srgbClr val="000000"/>
+                      </a:solidFill>
+                      <a:prstDash val="solid"/>
+                      <a:round/>
+                      <a:headEnd type="none" w="med" len="med"/>
+                      <a:tailEnd type="none" w="med" len="med"/>
+                    </a:lnL>
+                    <a:lnR>
+                      <a:noFill/>
+                    </a:lnR>
+                    <a:lnT w="12700" cap="flat" cmpd="sng" algn="ctr">
+                      <a:solidFill>
+                        <a:srgbClr val="000000"/>
+                      </a:solidFill>
+                      <a:prstDash val="solid"/>
+                      <a:round/>
+                      <a:headEnd type="none" w="med" len="med"/>
+                      <a:tailEnd type="none" w="med" len="med"/>
+                    </a:lnT>
+                    <a:lnB w="6350" cap="flat" cmpd="sng" algn="ctr">
+                      <a:solidFill>
+                        <a:srgbClr val="000000"/>
+                      </a:solidFill>
+                      <a:prstDash val="solid"/>
+                      <a:round/>
+                      <a:headEnd type="none" w="med" len="med"/>
+                      <a:tailEnd type="none" w="med" len="med"/>
+                    </a:lnB>
+                  </a:tcPr>
+                </a:tc>
+                <a:tc>
+                  <a:txBody>
+                    <a:bodyPr/>
+                    <a:lstStyle/>
+                    <a:p>
+                      <a:pPr algn="l" fontAlgn="ctr"/>
+                      <a:r>
+                        <a:rPr lang="en-GB" sz="1100" b="0" i="0" u="none" strike="noStrike">
+                          <a:solidFill>
+                            <a:srgbClr val="000000"/>
+                          </a:solidFill>
+                          <a:effectLst/>
+                          <a:latin typeface="Arial" panose="020B0604020202020204" pitchFamily="34" charset="0"/>
+                        </a:rPr>
+                        <a:t>1x1x1 (330), 0.5x1x1.5 (220), 1x1x1 (165)</a:t>
+                      </a:r>
+                    </a:p>
+                  </a:txBody>
+                  <a:tcPr marL="171450" marR="9525" marT="9525" marB="0" anchor="ctr">
+                    <a:lnL>
+                      <a:noFill/>
+                    </a:lnL>
+                    <a:lnR w="12700" cap="flat" cmpd="sng" algn="ctr">
+                      <a:solidFill>
+                        <a:srgbClr val="000000"/>
+                      </a:solidFill>
+                      <a:prstDash val="solid"/>
+                      <a:round/>
+                      <a:headEnd type="none" w="med" len="med"/>
+                      <a:tailEnd type="none" w="med" len="med"/>
+                    </a:lnR>
+                    <a:lnT w="12700" cap="flat" cmpd="sng" algn="ctr">
+                      <a:solidFill>
+                        <a:srgbClr val="000000"/>
+                      </a:solidFill>
+                      <a:prstDash val="solid"/>
+                      <a:round/>
+                      <a:headEnd type="none" w="med" len="med"/>
+                      <a:tailEnd type="none" w="med" len="med"/>
+                    </a:lnT>
+                    <a:lnB w="6350" cap="flat" cmpd="sng" algn="ctr">
+                      <a:solidFill>
+                        <a:srgbClr val="000000"/>
+                      </a:solidFill>
+                      <a:prstDash val="solid"/>
+                      <a:round/>
+                      <a:headEnd type="none" w="med" len="med"/>
+                      <a:tailEnd type="none" w="med" len="med"/>
+                    </a:lnB>
+                  </a:tcPr>
+                </a:tc>
+              </a:tr>
+              <a:tr h="190500">
+                <a:tc>
+                  <a:txBody>
+                    <a:bodyPr/>
+                    <a:lstStyle/>
+                    <a:p>
+                      <a:pPr algn="r" fontAlgn="b"/>
+                      <a:r>
+                        <a:rPr lang="en-GB" sz="1100" b="0" i="0" u="none" strike="noStrike">
+                          <a:solidFill>
+                            <a:srgbClr val="000000"/>
+                          </a:solidFill>
+                          <a:effectLst/>
+                          <a:latin typeface="Arial" panose="020B0604020202020204" pitchFamily="34" charset="0"/>
+                        </a:rPr>
+                        <a:t>2</a:t>
+                      </a:r>
+                    </a:p>
+                  </a:txBody>
+                  <a:tcPr marL="9525" marR="9525" marT="9525" marB="0" anchor="b">
+                    <a:lnL w="12700" cap="flat" cmpd="sng" algn="ctr">
+                      <a:solidFill>
+                        <a:srgbClr val="000000"/>
+                      </a:solidFill>
+                      <a:prstDash val="solid"/>
+                      <a:round/>
+                      <a:headEnd type="none" w="med" len="med"/>
+                      <a:tailEnd type="none" w="med" len="med"/>
+                    </a:lnL>
+                    <a:lnR>
+                      <a:noFill/>
+                    </a:lnR>
+                    <a:lnT w="6350" cap="flat" cmpd="sng" algn="ctr">
+                      <a:solidFill>
+                        <a:srgbClr val="000000"/>
+                      </a:solidFill>
+                      <a:prstDash val="solid"/>
+                      <a:round/>
+                      <a:headEnd type="none" w="med" len="med"/>
+                      <a:tailEnd type="none" w="med" len="med"/>
+                    </a:lnT>
+                    <a:lnB w="6350" cap="flat" cmpd="sng" algn="ctr">
+                      <a:solidFill>
+                        <a:srgbClr val="000000"/>
+                      </a:solidFill>
+                      <a:prstDash val="solid"/>
+                      <a:round/>
+                      <a:headEnd type="none" w="med" len="med"/>
+                      <a:tailEnd type="none" w="med" len="med"/>
+                    </a:lnB>
+                  </a:tcPr>
+                </a:tc>
+                <a:tc>
+                  <a:txBody>
+                    <a:bodyPr/>
+                    <a:lstStyle/>
+                    <a:p>
+                      <a:pPr algn="l" fontAlgn="b"/>
+                      <a:r>
+                        <a:rPr lang="en-GB" sz="1100" b="0" i="0" u="none" strike="noStrike">
+                          <a:solidFill>
+                            <a:srgbClr val="000000"/>
+                          </a:solidFill>
+                          <a:effectLst/>
+                          <a:latin typeface="Arial" panose="020B0604020202020204" pitchFamily="34" charset="0"/>
+                        </a:rPr>
+                        <a:t> </a:t>
+                      </a:r>
+                    </a:p>
+                  </a:txBody>
+                  <a:tcPr marL="9525" marR="9525" marT="9525" marB="0" anchor="b">
+                    <a:lnL>
+                      <a:noFill/>
+                    </a:lnL>
+                    <a:lnR w="6350" cap="flat" cmpd="sng" algn="ctr">
+                      <a:solidFill>
+                        <a:srgbClr val="000000"/>
+                      </a:solidFill>
+                      <a:prstDash val="solid"/>
+                      <a:round/>
+                      <a:headEnd type="none" w="med" len="med"/>
+                      <a:tailEnd type="none" w="med" len="med"/>
+                    </a:lnR>
+                    <a:lnT w="6350" cap="flat" cmpd="sng" algn="ctr">
+                      <a:solidFill>
+                        <a:srgbClr val="000000"/>
+                      </a:solidFill>
+                      <a:prstDash val="solid"/>
+                      <a:round/>
+                      <a:headEnd type="none" w="med" len="med"/>
+                      <a:tailEnd type="none" w="med" len="med"/>
+                    </a:lnT>
+                    <a:lnB w="6350" cap="flat" cmpd="sng" algn="ctr">
+                      <a:solidFill>
+                        <a:srgbClr val="000000"/>
+                      </a:solidFill>
+                      <a:prstDash val="solid"/>
+                      <a:round/>
+                      <a:headEnd type="none" w="med" len="med"/>
+                      <a:tailEnd type="none" w="med" len="med"/>
+                    </a:lnB>
+                  </a:tcPr>
+                </a:tc>
+                <a:tc>
+                  <a:txBody>
+                    <a:bodyPr/>
+                    <a:lstStyle/>
+                    <a:p>
+                      <a:pPr algn="ctr" fontAlgn="b"/>
+                      <a:r>
+                        <a:rPr lang="en-GB" sz="1100" b="0" i="0" u="none" strike="noStrike">
+                          <a:solidFill>
+                            <a:srgbClr val="000000"/>
+                          </a:solidFill>
+                          <a:effectLst/>
+                          <a:latin typeface="Arial" panose="020B0604020202020204" pitchFamily="34" charset="0"/>
+                        </a:rPr>
+                        <a:t> </a:t>
+                      </a:r>
+                    </a:p>
+                  </a:txBody>
+                  <a:tcPr marL="9525" marR="9525" marT="9525" marB="0" anchor="b">
+                    <a:lnL w="6350" cap="flat" cmpd="sng" algn="ctr">
+                      <a:solidFill>
+                        <a:srgbClr val="000000"/>
+                      </a:solidFill>
+                      <a:prstDash val="solid"/>
+                      <a:round/>
+                      <a:headEnd type="none" w="med" len="med"/>
+                      <a:tailEnd type="none" w="med" len="med"/>
+                    </a:lnL>
+                    <a:lnR>
+                      <a:noFill/>
+                    </a:lnR>
+                    <a:lnT w="6350" cap="flat" cmpd="sng" algn="ctr">
+                      <a:solidFill>
+                        <a:srgbClr val="000000"/>
+                      </a:solidFill>
+                      <a:prstDash val="solid"/>
+                      <a:round/>
+                      <a:headEnd type="none" w="med" len="med"/>
+                      <a:tailEnd type="none" w="med" len="med"/>
+                    </a:lnT>
+                    <a:lnB w="6350" cap="flat" cmpd="sng" algn="ctr">
+                      <a:solidFill>
+                        <a:srgbClr val="000000"/>
+                      </a:solidFill>
+                      <a:prstDash val="solid"/>
+                      <a:round/>
+                      <a:headEnd type="none" w="med" len="med"/>
+                      <a:tailEnd type="none" w="med" len="med"/>
+                    </a:lnB>
+                  </a:tcPr>
+                </a:tc>
+                <a:tc>
+                  <a:txBody>
+                    <a:bodyPr/>
+                    <a:lstStyle/>
+                    <a:p>
+                      <a:pPr algn="l" fontAlgn="ctr"/>
+                      <a:r>
+                        <a:rPr lang="en-GB" sz="1100" b="0" i="0" u="none" strike="noStrike">
+                          <a:solidFill>
+                            <a:srgbClr val="000000"/>
+                          </a:solidFill>
+                          <a:effectLst/>
+                          <a:latin typeface="Arial" panose="020B0604020202020204" pitchFamily="34" charset="0"/>
+                        </a:rPr>
+                        <a:t>2x3x3 (10), 2x2.5x3 (11), 2.5x2.5x2.5 (11)</a:t>
+                      </a:r>
+                    </a:p>
+                  </a:txBody>
+                  <a:tcPr marL="171450" marR="9525" marT="9525" marB="0" anchor="ctr">
+                    <a:lnL>
+                      <a:noFill/>
+                    </a:lnL>
+                    <a:lnR w="12700" cap="flat" cmpd="sng" algn="ctr">
+                      <a:solidFill>
+                        <a:srgbClr val="000000"/>
+                      </a:solidFill>
+                      <a:prstDash val="solid"/>
+                      <a:round/>
+                      <a:headEnd type="none" w="med" len="med"/>
+                      <a:tailEnd type="none" w="med" len="med"/>
+                    </a:lnR>
+                    <a:lnT w="6350" cap="flat" cmpd="sng" algn="ctr">
+                      <a:solidFill>
+                        <a:srgbClr val="000000"/>
+                      </a:solidFill>
+                      <a:prstDash val="solid"/>
+                      <a:round/>
+                      <a:headEnd type="none" w="med" len="med"/>
+                      <a:tailEnd type="none" w="med" len="med"/>
+                    </a:lnT>
+                    <a:lnB w="6350" cap="flat" cmpd="sng" algn="ctr">
+                      <a:solidFill>
+                        <a:srgbClr val="000000"/>
+                      </a:solidFill>
+                      <a:prstDash val="solid"/>
+                      <a:round/>
+                      <a:headEnd type="none" w="med" len="med"/>
+                      <a:tailEnd type="none" w="med" len="med"/>
+                    </a:lnB>
+                  </a:tcPr>
+                </a:tc>
+              </a:tr>
+              <a:tr h="190500">
+                <a:tc>
+                  <a:txBody>
+                    <a:bodyPr/>
+                    <a:lstStyle/>
+                    <a:p>
+                      <a:pPr algn="r" fontAlgn="b"/>
+                      <a:r>
+                        <a:rPr lang="en-GB" sz="1100" b="0" i="0" u="none" strike="noStrike">
+                          <a:solidFill>
+                            <a:srgbClr val="000000"/>
+                          </a:solidFill>
+                          <a:effectLst/>
+                          <a:latin typeface="Arial" panose="020B0604020202020204" pitchFamily="34" charset="0"/>
+                        </a:rPr>
+                        <a:t>3</a:t>
+                      </a:r>
+                    </a:p>
+                  </a:txBody>
+                  <a:tcPr marL="9525" marR="9525" marT="9525" marB="0" anchor="b">
+                    <a:lnL w="12700" cap="flat" cmpd="sng" algn="ctr">
+                      <a:solidFill>
+                        <a:srgbClr val="000000"/>
+                      </a:solidFill>
+                      <a:prstDash val="solid"/>
+                      <a:round/>
+                      <a:headEnd type="none" w="med" len="med"/>
+                      <a:tailEnd type="none" w="med" len="med"/>
+                    </a:lnL>
+                    <a:lnR>
+                      <a:noFill/>
+                    </a:lnR>
+                    <a:lnT w="6350" cap="flat" cmpd="sng" algn="ctr">
+                      <a:solidFill>
+                        <a:srgbClr val="000000"/>
+                      </a:solidFill>
+                      <a:prstDash val="solid"/>
+                      <a:round/>
+                      <a:headEnd type="none" w="med" len="med"/>
+                      <a:tailEnd type="none" w="med" len="med"/>
+                    </a:lnT>
+                    <a:lnB w="6350" cap="flat" cmpd="sng" algn="ctr">
+                      <a:solidFill>
+                        <a:srgbClr val="000000"/>
+                      </a:solidFill>
+                      <a:prstDash val="solid"/>
+                      <a:round/>
+                      <a:headEnd type="none" w="med" len="med"/>
+                      <a:tailEnd type="none" w="med" len="med"/>
+                    </a:lnB>
+                  </a:tcPr>
+                </a:tc>
+                <a:tc>
+                  <a:txBody>
+                    <a:bodyPr/>
+                    <a:lstStyle/>
+                    <a:p>
+                      <a:pPr algn="ctr" fontAlgn="b"/>
+                      <a:r>
+                        <a:rPr lang="en-GB" sz="1100" b="0" i="0" u="none" strike="noStrike">
+                          <a:solidFill>
+                            <a:srgbClr val="000000"/>
+                          </a:solidFill>
+                          <a:effectLst/>
+                          <a:latin typeface="Arial" panose="020B0604020202020204" pitchFamily="34" charset="0"/>
+                        </a:rPr>
+                        <a:t> </a:t>
+                      </a:r>
+                    </a:p>
+                  </a:txBody>
+                  <a:tcPr marL="9525" marR="9525" marT="9525" marB="0" anchor="b">
+                    <a:lnL>
+                      <a:noFill/>
+                    </a:lnL>
+                    <a:lnR w="6350" cap="flat" cmpd="sng" algn="ctr">
+                      <a:solidFill>
+                        <a:srgbClr val="000000"/>
+                      </a:solidFill>
+                      <a:prstDash val="solid"/>
+                      <a:round/>
+                      <a:headEnd type="none" w="med" len="med"/>
+                      <a:tailEnd type="none" w="med" len="med"/>
+                    </a:lnR>
+                    <a:lnT w="6350" cap="flat" cmpd="sng" algn="ctr">
+                      <a:solidFill>
+                        <a:srgbClr val="000000"/>
+                      </a:solidFill>
+                      <a:prstDash val="solid"/>
+                      <a:round/>
+                      <a:headEnd type="none" w="med" len="med"/>
+                      <a:tailEnd type="none" w="med" len="med"/>
+                    </a:lnT>
+                    <a:lnB w="6350" cap="flat" cmpd="sng" algn="ctr">
+                      <a:solidFill>
+                        <a:srgbClr val="000000"/>
+                      </a:solidFill>
+                      <a:prstDash val="solid"/>
+                      <a:round/>
+                      <a:headEnd type="none" w="med" len="med"/>
+                      <a:tailEnd type="none" w="med" len="med"/>
+                    </a:lnB>
+                  </a:tcPr>
+                </a:tc>
+                <a:tc>
+                  <a:txBody>
+                    <a:bodyPr/>
+                    <a:lstStyle/>
+                    <a:p>
+                      <a:pPr algn="ctr" fontAlgn="b"/>
+                      <a:r>
+                        <a:rPr lang="en-GB" sz="1100" b="0" i="0" u="none" strike="noStrike">
+                          <a:solidFill>
+                            <a:srgbClr val="000000"/>
+                          </a:solidFill>
+                          <a:effectLst/>
+                          <a:latin typeface="Arial" panose="020B0604020202020204" pitchFamily="34" charset="0"/>
+                        </a:rPr>
+                        <a:t> </a:t>
+                      </a:r>
+                    </a:p>
+                  </a:txBody>
+                  <a:tcPr marL="9525" marR="9525" marT="9525" marB="0" anchor="b">
+                    <a:lnL w="6350" cap="flat" cmpd="sng" algn="ctr">
+                      <a:solidFill>
+                        <a:srgbClr val="000000"/>
+                      </a:solidFill>
+                      <a:prstDash val="solid"/>
+                      <a:round/>
+                      <a:headEnd type="none" w="med" len="med"/>
+                      <a:tailEnd type="none" w="med" len="med"/>
+                    </a:lnL>
+                    <a:lnR>
+                      <a:noFill/>
+                    </a:lnR>
+                    <a:lnT w="6350" cap="flat" cmpd="sng" algn="ctr">
+                      <a:solidFill>
+                        <a:srgbClr val="000000"/>
+                      </a:solidFill>
+                      <a:prstDash val="solid"/>
+                      <a:round/>
+                      <a:headEnd type="none" w="med" len="med"/>
+                      <a:tailEnd type="none" w="med" len="med"/>
+                    </a:lnT>
+                    <a:lnB w="6350" cap="flat" cmpd="sng" algn="ctr">
+                      <a:solidFill>
+                        <a:srgbClr val="000000"/>
+                      </a:solidFill>
+                      <a:prstDash val="solid"/>
+                      <a:round/>
+                      <a:headEnd type="none" w="med" len="med"/>
+                      <a:tailEnd type="none" w="med" len="med"/>
+                    </a:lnB>
+                  </a:tcPr>
+                </a:tc>
+                <a:tc>
+                  <a:txBody>
+                    <a:bodyPr/>
+                    <a:lstStyle/>
+                    <a:p>
+                      <a:pPr algn="l" fontAlgn="ctr"/>
+                      <a:r>
+                        <a:rPr lang="en-GB" sz="1100" b="0" i="0" u="none" strike="noStrike">
+                          <a:solidFill>
+                            <a:srgbClr val="000000"/>
+                          </a:solidFill>
+                          <a:effectLst/>
+                          <a:latin typeface="Arial" panose="020B0604020202020204" pitchFamily="34" charset="0"/>
+                        </a:rPr>
+                        <a:t>1x1x1 (165), 1.5x1.5x1.5 (50), 2x2x2 (21)</a:t>
+                      </a:r>
+                    </a:p>
+                  </a:txBody>
+                  <a:tcPr marL="171450" marR="9525" marT="9525" marB="0" anchor="ctr">
+                    <a:lnL>
+                      <a:noFill/>
+                    </a:lnL>
+                    <a:lnR w="12700" cap="flat" cmpd="sng" algn="ctr">
+                      <a:solidFill>
+                        <a:srgbClr val="000000"/>
+                      </a:solidFill>
+                      <a:prstDash val="solid"/>
+                      <a:round/>
+                      <a:headEnd type="none" w="med" len="med"/>
+                      <a:tailEnd type="none" w="med" len="med"/>
+                    </a:lnR>
+                    <a:lnT w="6350" cap="flat" cmpd="sng" algn="ctr">
+                      <a:solidFill>
+                        <a:srgbClr val="000000"/>
+                      </a:solidFill>
+                      <a:prstDash val="solid"/>
+                      <a:round/>
+                      <a:headEnd type="none" w="med" len="med"/>
+                      <a:tailEnd type="none" w="med" len="med"/>
+                    </a:lnT>
+                    <a:lnB w="6350" cap="flat" cmpd="sng" algn="ctr">
+                      <a:solidFill>
+                        <a:srgbClr val="000000"/>
+                      </a:solidFill>
+                      <a:prstDash val="solid"/>
+                      <a:round/>
+                      <a:headEnd type="none" w="med" len="med"/>
+                      <a:tailEnd type="none" w="med" len="med"/>
+                    </a:lnB>
+                  </a:tcPr>
+                </a:tc>
+              </a:tr>
+              <a:tr h="190500">
+                <a:tc>
+                  <a:txBody>
+                    <a:bodyPr/>
+                    <a:lstStyle/>
+                    <a:p>
+                      <a:pPr algn="r" fontAlgn="b"/>
+                      <a:r>
+                        <a:rPr lang="en-GB" sz="1100" b="0" i="0" u="none" strike="noStrike">
+                          <a:solidFill>
+                            <a:srgbClr val="000000"/>
+                          </a:solidFill>
+                          <a:effectLst/>
+                          <a:latin typeface="Arial" panose="020B0604020202020204" pitchFamily="34" charset="0"/>
+                        </a:rPr>
+                        <a:t>4</a:t>
+                      </a:r>
+                    </a:p>
+                  </a:txBody>
+                  <a:tcPr marL="9525" marR="9525" marT="9525" marB="0" anchor="b">
+                    <a:lnL w="12700" cap="flat" cmpd="sng" algn="ctr">
+                      <a:solidFill>
+                        <a:srgbClr val="000000"/>
+                      </a:solidFill>
+                      <a:prstDash val="solid"/>
+                      <a:round/>
+                      <a:headEnd type="none" w="med" len="med"/>
+                      <a:tailEnd type="none" w="med" len="med"/>
+                    </a:lnL>
+                    <a:lnR>
+                      <a:noFill/>
+                    </a:lnR>
+                    <a:lnT w="6350" cap="flat" cmpd="sng" algn="ctr">
+                      <a:solidFill>
+                        <a:srgbClr val="000000"/>
+                      </a:solidFill>
+                      <a:prstDash val="solid"/>
+                      <a:round/>
+                      <a:headEnd type="none" w="med" len="med"/>
+                      <a:tailEnd type="none" w="med" len="med"/>
+                    </a:lnT>
+                    <a:lnB w="6350" cap="flat" cmpd="sng" algn="ctr">
+                      <a:solidFill>
+                        <a:srgbClr val="000000"/>
+                      </a:solidFill>
+                      <a:prstDash val="solid"/>
+                      <a:round/>
+                      <a:headEnd type="none" w="med" len="med"/>
+                      <a:tailEnd type="none" w="med" len="med"/>
+                    </a:lnB>
+                  </a:tcPr>
+                </a:tc>
+                <a:tc>
+                  <a:txBody>
+                    <a:bodyPr/>
+                    <a:lstStyle/>
+                    <a:p>
+                      <a:pPr algn="ctr" fontAlgn="b"/>
+                      <a:r>
+                        <a:rPr lang="en-GB" sz="1100" b="0" i="0" u="none" strike="noStrike">
+                          <a:solidFill>
+                            <a:srgbClr val="000000"/>
+                          </a:solidFill>
+                          <a:effectLst/>
+                          <a:latin typeface="Arial" panose="020B0604020202020204" pitchFamily="34" charset="0"/>
+                        </a:rPr>
+                        <a:t> </a:t>
+                      </a:r>
+                    </a:p>
+                  </a:txBody>
+                  <a:tcPr marL="9525" marR="9525" marT="9525" marB="0" anchor="b">
+                    <a:lnL>
+                      <a:noFill/>
+                    </a:lnL>
+                    <a:lnR w="6350" cap="flat" cmpd="sng" algn="ctr">
+                      <a:solidFill>
+                        <a:srgbClr val="000000"/>
+                      </a:solidFill>
+                      <a:prstDash val="solid"/>
+                      <a:round/>
+                      <a:headEnd type="none" w="med" len="med"/>
+                      <a:tailEnd type="none" w="med" len="med"/>
+                    </a:lnR>
+                    <a:lnT w="6350" cap="flat" cmpd="sng" algn="ctr">
+                      <a:solidFill>
+                        <a:srgbClr val="000000"/>
+                      </a:solidFill>
+                      <a:prstDash val="solid"/>
+                      <a:round/>
+                      <a:headEnd type="none" w="med" len="med"/>
+                      <a:tailEnd type="none" w="med" len="med"/>
+                    </a:lnT>
+                    <a:lnB w="6350" cap="flat" cmpd="sng" algn="ctr">
+                      <a:solidFill>
+                        <a:srgbClr val="000000"/>
+                      </a:solidFill>
+                      <a:prstDash val="solid"/>
+                      <a:round/>
+                      <a:headEnd type="none" w="med" len="med"/>
+                      <a:tailEnd type="none" w="med" len="med"/>
+                    </a:lnB>
+                  </a:tcPr>
+                </a:tc>
+                <a:tc>
+                  <a:txBody>
+                    <a:bodyPr/>
+                    <a:lstStyle/>
+                    <a:p>
+                      <a:pPr algn="ctr" fontAlgn="b"/>
+                      <a:r>
+                        <a:rPr lang="en-GB" sz="1100" b="0" i="0" u="none" strike="noStrike">
+                          <a:solidFill>
+                            <a:srgbClr val="000000"/>
+                          </a:solidFill>
+                          <a:effectLst/>
+                          <a:latin typeface="Arial" panose="020B0604020202020204" pitchFamily="34" charset="0"/>
+                        </a:rPr>
+                        <a:t> </a:t>
+                      </a:r>
+                    </a:p>
+                  </a:txBody>
+                  <a:tcPr marL="9525" marR="9525" marT="9525" marB="0" anchor="b">
+                    <a:lnL w="6350" cap="flat" cmpd="sng" algn="ctr">
+                      <a:solidFill>
+                        <a:srgbClr val="000000"/>
+                      </a:solidFill>
+                      <a:prstDash val="solid"/>
+                      <a:round/>
+                      <a:headEnd type="none" w="med" len="med"/>
+                      <a:tailEnd type="none" w="med" len="med"/>
+                    </a:lnL>
+                    <a:lnR>
+                      <a:noFill/>
+                    </a:lnR>
+                    <a:lnT w="6350" cap="flat" cmpd="sng" algn="ctr">
+                      <a:solidFill>
+                        <a:srgbClr val="000000"/>
+                      </a:solidFill>
+                      <a:prstDash val="solid"/>
+                      <a:round/>
+                      <a:headEnd type="none" w="med" len="med"/>
+                      <a:tailEnd type="none" w="med" len="med"/>
+                    </a:lnT>
+                    <a:lnB w="6350" cap="flat" cmpd="sng" algn="ctr">
+                      <a:solidFill>
+                        <a:srgbClr val="000000"/>
+                      </a:solidFill>
+                      <a:prstDash val="solid"/>
+                      <a:round/>
+                      <a:headEnd type="none" w="med" len="med"/>
+                      <a:tailEnd type="none" w="med" len="med"/>
+                    </a:lnB>
+                  </a:tcPr>
+                </a:tc>
+                <a:tc>
+                  <a:txBody>
+                    <a:bodyPr/>
+                    <a:lstStyle/>
+                    <a:p>
+                      <a:pPr algn="l" fontAlgn="ctr"/>
+                      <a:r>
+                        <a:rPr lang="en-GB" sz="1100" b="0" i="0" u="none" strike="noStrike" dirty="0">
+                          <a:solidFill>
+                            <a:srgbClr val="000000"/>
+                          </a:solidFill>
+                          <a:effectLst/>
+                          <a:latin typeface="Arial" panose="020B0604020202020204" pitchFamily="34" charset="0"/>
+                        </a:rPr>
+                        <a:t>2.5x0.5x0.5 (264), 3x1x1 (55), 4x1x0.5 (83)</a:t>
+                      </a:r>
+                    </a:p>
+                  </a:txBody>
+                  <a:tcPr marL="171450" marR="9525" marT="9525" marB="0" anchor="ctr">
+                    <a:lnL>
+                      <a:noFill/>
+                    </a:lnL>
+                    <a:lnR w="12700" cap="flat" cmpd="sng" algn="ctr">
+                      <a:solidFill>
+                        <a:srgbClr val="000000"/>
+                      </a:solidFill>
+                      <a:prstDash val="solid"/>
+                      <a:round/>
+                      <a:headEnd type="none" w="med" len="med"/>
+                      <a:tailEnd type="none" w="med" len="med"/>
+                    </a:lnR>
+                    <a:lnT w="6350" cap="flat" cmpd="sng" algn="ctr">
+                      <a:solidFill>
+                        <a:srgbClr val="000000"/>
+                      </a:solidFill>
+                      <a:prstDash val="solid"/>
+                      <a:round/>
+                      <a:headEnd type="none" w="med" len="med"/>
+                      <a:tailEnd type="none" w="med" len="med"/>
+                    </a:lnT>
+                    <a:lnB w="6350" cap="flat" cmpd="sng" algn="ctr">
+                      <a:solidFill>
+                        <a:srgbClr val="000000"/>
+                      </a:solidFill>
+                      <a:prstDash val="solid"/>
+                      <a:round/>
+                      <a:headEnd type="none" w="med" len="med"/>
+                      <a:tailEnd type="none" w="med" len="med"/>
+                    </a:lnB>
+                  </a:tcPr>
+                </a:tc>
+              </a:tr>
+              <a:tr h="190500">
+                <a:tc>
+                  <a:txBody>
+                    <a:bodyPr/>
+                    <a:lstStyle/>
+                    <a:p>
+                      <a:pPr algn="r" fontAlgn="b"/>
+                      <a:r>
+                        <a:rPr lang="en-GB" sz="1100" b="0" i="0" u="none" strike="noStrike">
+                          <a:solidFill>
+                            <a:srgbClr val="000000"/>
+                          </a:solidFill>
+                          <a:effectLst/>
+                          <a:latin typeface="Arial" panose="020B0604020202020204" pitchFamily="34" charset="0"/>
+                        </a:rPr>
+                        <a:t>5</a:t>
+                      </a:r>
+                    </a:p>
+                  </a:txBody>
+                  <a:tcPr marL="9525" marR="9525" marT="9525" marB="0" anchor="b">
+                    <a:lnL w="12700" cap="flat" cmpd="sng" algn="ctr">
+                      <a:solidFill>
+                        <a:srgbClr val="000000"/>
+                      </a:solidFill>
+                      <a:prstDash val="solid"/>
+                      <a:round/>
+                      <a:headEnd type="none" w="med" len="med"/>
+                      <a:tailEnd type="none" w="med" len="med"/>
+                    </a:lnL>
+                    <a:lnR>
+                      <a:noFill/>
+                    </a:lnR>
+                    <a:lnT w="6350" cap="flat" cmpd="sng" algn="ctr">
+                      <a:solidFill>
+                        <a:srgbClr val="000000"/>
+                      </a:solidFill>
+                      <a:prstDash val="solid"/>
+                      <a:round/>
+                      <a:headEnd type="none" w="med" len="med"/>
+                      <a:tailEnd type="none" w="med" len="med"/>
+                    </a:lnT>
+                    <a:lnB w="6350" cap="flat" cmpd="sng" algn="ctr">
+                      <a:solidFill>
+                        <a:srgbClr val="000000"/>
+                      </a:solidFill>
+                      <a:prstDash val="solid"/>
+                      <a:round/>
+                      <a:headEnd type="none" w="med" len="med"/>
+                      <a:tailEnd type="none" w="med" len="med"/>
+                    </a:lnB>
+                  </a:tcPr>
+                </a:tc>
+                <a:tc>
+                  <a:txBody>
+                    <a:bodyPr/>
+                    <a:lstStyle/>
+                    <a:p>
+                      <a:pPr algn="ctr" fontAlgn="b"/>
+                      <a:r>
+                        <a:rPr lang="en-GB" sz="1100" b="0" i="0" u="none" strike="noStrike">
+                          <a:solidFill>
+                            <a:srgbClr val="000000"/>
+                          </a:solidFill>
+                          <a:effectLst/>
+                          <a:latin typeface="Arial" panose="020B0604020202020204" pitchFamily="34" charset="0"/>
+                        </a:rPr>
+                        <a:t> </a:t>
+                      </a:r>
+                    </a:p>
+                  </a:txBody>
+                  <a:tcPr marL="9525" marR="9525" marT="9525" marB="0" anchor="b">
+                    <a:lnL>
+                      <a:noFill/>
+                    </a:lnL>
+                    <a:lnR w="6350" cap="flat" cmpd="sng" algn="ctr">
+                      <a:solidFill>
+                        <a:srgbClr val="000000"/>
+                      </a:solidFill>
+                      <a:prstDash val="solid"/>
+                      <a:round/>
+                      <a:headEnd type="none" w="med" len="med"/>
+                      <a:tailEnd type="none" w="med" len="med"/>
+                    </a:lnR>
+                    <a:lnT w="6350" cap="flat" cmpd="sng" algn="ctr">
+                      <a:solidFill>
+                        <a:srgbClr val="000000"/>
+                      </a:solidFill>
+                      <a:prstDash val="solid"/>
+                      <a:round/>
+                      <a:headEnd type="none" w="med" len="med"/>
+                      <a:tailEnd type="none" w="med" len="med"/>
+                    </a:lnT>
+                    <a:lnB w="6350" cap="flat" cmpd="sng" algn="ctr">
+                      <a:solidFill>
+                        <a:srgbClr val="000000"/>
+                      </a:solidFill>
+                      <a:prstDash val="solid"/>
+                      <a:round/>
+                      <a:headEnd type="none" w="med" len="med"/>
+                      <a:tailEnd type="none" w="med" len="med"/>
+                    </a:lnB>
+                  </a:tcPr>
+                </a:tc>
+                <a:tc>
+                  <a:txBody>
+                    <a:bodyPr/>
+                    <a:lstStyle/>
+                    <a:p>
+                      <a:pPr algn="ctr" fontAlgn="b"/>
+                      <a:r>
+                        <a:rPr lang="en-GB" sz="1100" b="0" i="0" u="none" strike="noStrike">
+                          <a:solidFill>
+                            <a:srgbClr val="000000"/>
+                          </a:solidFill>
+                          <a:effectLst/>
+                          <a:latin typeface="Arial" panose="020B0604020202020204" pitchFamily="34" charset="0"/>
+                        </a:rPr>
+                        <a:t> </a:t>
+                      </a:r>
+                    </a:p>
+                  </a:txBody>
+                  <a:tcPr marL="9525" marR="9525" marT="9525" marB="0" anchor="b">
+                    <a:lnL w="6350" cap="flat" cmpd="sng" algn="ctr">
+                      <a:solidFill>
+                        <a:srgbClr val="000000"/>
+                      </a:solidFill>
+                      <a:prstDash val="solid"/>
+                      <a:round/>
+                      <a:headEnd type="none" w="med" len="med"/>
+                      <a:tailEnd type="none" w="med" len="med"/>
+                    </a:lnL>
+                    <a:lnR>
+                      <a:noFill/>
+                    </a:lnR>
+                    <a:lnT w="6350" cap="flat" cmpd="sng" algn="ctr">
+                      <a:solidFill>
+                        <a:srgbClr val="000000"/>
+                      </a:solidFill>
+                      <a:prstDash val="solid"/>
+                      <a:round/>
+                      <a:headEnd type="none" w="med" len="med"/>
+                      <a:tailEnd type="none" w="med" len="med"/>
+                    </a:lnT>
+                    <a:lnB w="6350" cap="flat" cmpd="sng" algn="ctr">
+                      <a:solidFill>
+                        <a:srgbClr val="000000"/>
+                      </a:solidFill>
+                      <a:prstDash val="solid"/>
+                      <a:round/>
+                      <a:headEnd type="none" w="med" len="med"/>
+                      <a:tailEnd type="none" w="med" len="med"/>
+                    </a:lnB>
+                  </a:tcPr>
+                </a:tc>
+                <a:tc>
+                  <a:txBody>
+                    <a:bodyPr/>
+                    <a:lstStyle/>
+                    <a:p>
+                      <a:pPr algn="l" fontAlgn="ctr"/>
+                      <a:r>
+                        <a:rPr lang="en-GB" sz="1100" b="0" i="0" u="none" strike="noStrike">
+                          <a:solidFill>
+                            <a:srgbClr val="000000"/>
+                          </a:solidFill>
+                          <a:effectLst/>
+                          <a:latin typeface="Arial" panose="020B0604020202020204" pitchFamily="34" charset="0"/>
+                        </a:rPr>
+                        <a:t>2x2.5x0.5 (66), 1.5x1.5x0.5 (147), 3x2x1 (28)</a:t>
+                      </a:r>
+                    </a:p>
+                  </a:txBody>
+                  <a:tcPr marL="171450" marR="9525" marT="9525" marB="0" anchor="ctr">
+                    <a:lnL>
+                      <a:noFill/>
+                    </a:lnL>
+                    <a:lnR w="12700" cap="flat" cmpd="sng" algn="ctr">
+                      <a:solidFill>
+                        <a:srgbClr val="000000"/>
+                      </a:solidFill>
+                      <a:prstDash val="solid"/>
+                      <a:round/>
+                      <a:headEnd type="none" w="med" len="med"/>
+                      <a:tailEnd type="none" w="med" len="med"/>
+                    </a:lnR>
+                    <a:lnT w="6350" cap="flat" cmpd="sng" algn="ctr">
+                      <a:solidFill>
+                        <a:srgbClr val="000000"/>
+                      </a:solidFill>
+                      <a:prstDash val="solid"/>
+                      <a:round/>
+                      <a:headEnd type="none" w="med" len="med"/>
+                      <a:tailEnd type="none" w="med" len="med"/>
+                    </a:lnT>
+                    <a:lnB w="6350" cap="flat" cmpd="sng" algn="ctr">
+                      <a:solidFill>
+                        <a:srgbClr val="000000"/>
+                      </a:solidFill>
+                      <a:prstDash val="solid"/>
+                      <a:round/>
+                      <a:headEnd type="none" w="med" len="med"/>
+                      <a:tailEnd type="none" w="med" len="med"/>
+                    </a:lnB>
+                  </a:tcPr>
+                </a:tc>
+              </a:tr>
+              <a:tr h="190500">
+                <a:tc>
+                  <a:txBody>
+                    <a:bodyPr/>
+                    <a:lstStyle/>
+                    <a:p>
+                      <a:pPr algn="r" fontAlgn="b"/>
+                      <a:r>
+                        <a:rPr lang="en-GB" sz="1100" b="0" i="0" u="none" strike="noStrike">
+                          <a:solidFill>
+                            <a:srgbClr val="000000"/>
+                          </a:solidFill>
+                          <a:effectLst/>
+                          <a:latin typeface="Arial" panose="020B0604020202020204" pitchFamily="34" charset="0"/>
+                        </a:rPr>
+                        <a:t>6</a:t>
+                      </a:r>
+                    </a:p>
+                  </a:txBody>
+                  <a:tcPr marL="9525" marR="9525" marT="9525" marB="0" anchor="b">
+                    <a:lnL w="12700" cap="flat" cmpd="sng" algn="ctr">
+                      <a:solidFill>
+                        <a:srgbClr val="000000"/>
+                      </a:solidFill>
+                      <a:prstDash val="solid"/>
+                      <a:round/>
+                      <a:headEnd type="none" w="med" len="med"/>
+                      <a:tailEnd type="none" w="med" len="med"/>
+                    </a:lnL>
+                    <a:lnR>
+                      <a:noFill/>
+                    </a:lnR>
+                    <a:lnT w="6350" cap="flat" cmpd="sng" algn="ctr">
+                      <a:solidFill>
+                        <a:srgbClr val="000000"/>
+                      </a:solidFill>
+                      <a:prstDash val="solid"/>
+                      <a:round/>
+                      <a:headEnd type="none" w="med" len="med"/>
+                      <a:tailEnd type="none" w="med" len="med"/>
+                    </a:lnT>
+                    <a:lnB w="6350" cap="flat" cmpd="sng" algn="ctr">
+                      <a:solidFill>
+                        <a:srgbClr val="000000"/>
+                      </a:solidFill>
+                      <a:prstDash val="solid"/>
+                      <a:round/>
+                      <a:headEnd type="none" w="med" len="med"/>
+                      <a:tailEnd type="none" w="med" len="med"/>
+                    </a:lnB>
+                  </a:tcPr>
+                </a:tc>
+                <a:tc>
+                  <a:txBody>
+                    <a:bodyPr/>
+                    <a:lstStyle/>
+                    <a:p>
+                      <a:pPr algn="ctr" fontAlgn="b"/>
+                      <a:r>
+                        <a:rPr lang="en-GB" sz="1100" b="0" i="0" u="none" strike="noStrike">
+                          <a:solidFill>
+                            <a:srgbClr val="000000"/>
+                          </a:solidFill>
+                          <a:effectLst/>
+                          <a:latin typeface="Arial" panose="020B0604020202020204" pitchFamily="34" charset="0"/>
+                        </a:rPr>
+                        <a:t> </a:t>
+                      </a:r>
+                    </a:p>
+                  </a:txBody>
+                  <a:tcPr marL="9525" marR="9525" marT="9525" marB="0" anchor="b">
+                    <a:lnL>
+                      <a:noFill/>
+                    </a:lnL>
+                    <a:lnR w="6350" cap="flat" cmpd="sng" algn="ctr">
+                      <a:solidFill>
+                        <a:srgbClr val="000000"/>
+                      </a:solidFill>
+                      <a:prstDash val="solid"/>
+                      <a:round/>
+                      <a:headEnd type="none" w="med" len="med"/>
+                      <a:tailEnd type="none" w="med" len="med"/>
+                    </a:lnR>
+                    <a:lnT w="6350" cap="flat" cmpd="sng" algn="ctr">
+                      <a:solidFill>
+                        <a:srgbClr val="000000"/>
+                      </a:solidFill>
+                      <a:prstDash val="solid"/>
+                      <a:round/>
+                      <a:headEnd type="none" w="med" len="med"/>
+                      <a:tailEnd type="none" w="med" len="med"/>
+                    </a:lnT>
+                    <a:lnB w="6350" cap="flat" cmpd="sng" algn="ctr">
+                      <a:solidFill>
+                        <a:srgbClr val="000000"/>
+                      </a:solidFill>
+                      <a:prstDash val="solid"/>
+                      <a:round/>
+                      <a:headEnd type="none" w="med" len="med"/>
+                      <a:tailEnd type="none" w="med" len="med"/>
+                    </a:lnB>
+                  </a:tcPr>
+                </a:tc>
+                <a:tc>
+                  <a:txBody>
+                    <a:bodyPr/>
+                    <a:lstStyle/>
+                    <a:p>
+                      <a:pPr algn="ctr" fontAlgn="b"/>
+                      <a:r>
+                        <a:rPr lang="en-GB" sz="1100" b="0" i="0" u="none" strike="noStrike">
+                          <a:solidFill>
+                            <a:srgbClr val="000000"/>
+                          </a:solidFill>
+                          <a:effectLst/>
+                          <a:latin typeface="Arial" panose="020B0604020202020204" pitchFamily="34" charset="0"/>
+                        </a:rPr>
+                        <a:t> </a:t>
+                      </a:r>
+                    </a:p>
+                  </a:txBody>
+                  <a:tcPr marL="9525" marR="9525" marT="9525" marB="0" anchor="b">
+                    <a:lnL w="6350" cap="flat" cmpd="sng" algn="ctr">
+                      <a:solidFill>
+                        <a:srgbClr val="000000"/>
+                      </a:solidFill>
+                      <a:prstDash val="solid"/>
+                      <a:round/>
+                      <a:headEnd type="none" w="med" len="med"/>
+                      <a:tailEnd type="none" w="med" len="med"/>
+                    </a:lnL>
+                    <a:lnR>
+                      <a:noFill/>
+                    </a:lnR>
+                    <a:lnT w="6350" cap="flat" cmpd="sng" algn="ctr">
+                      <a:solidFill>
+                        <a:srgbClr val="000000"/>
+                      </a:solidFill>
+                      <a:prstDash val="solid"/>
+                      <a:round/>
+                      <a:headEnd type="none" w="med" len="med"/>
+                      <a:tailEnd type="none" w="med" len="med"/>
+                    </a:lnT>
+                    <a:lnB w="6350" cap="flat" cmpd="sng" algn="ctr">
+                      <a:solidFill>
+                        <a:srgbClr val="000000"/>
+                      </a:solidFill>
+                      <a:prstDash val="solid"/>
+                      <a:round/>
+                      <a:headEnd type="none" w="med" len="med"/>
+                      <a:tailEnd type="none" w="med" len="med"/>
+                    </a:lnB>
+                  </a:tcPr>
+                </a:tc>
+                <a:tc>
+                  <a:txBody>
+                    <a:bodyPr/>
+                    <a:lstStyle/>
+                    <a:p>
+                      <a:pPr algn="l" fontAlgn="ctr"/>
+                      <a:r>
+                        <a:rPr lang="pt-BR" sz="1100" b="0" i="0" u="none" strike="noStrike">
+                          <a:solidFill>
+                            <a:srgbClr val="000000"/>
+                          </a:solidFill>
+                          <a:effectLst/>
+                          <a:latin typeface="Arial" panose="020B0604020202020204" pitchFamily="34" charset="0"/>
+                        </a:rPr>
+                        <a:t>A (15), B (15), C (15), 2.x2.05 (15)</a:t>
+                      </a:r>
+                    </a:p>
+                  </a:txBody>
+                  <a:tcPr marL="171450" marR="9525" marT="9525" marB="0" anchor="ctr">
+                    <a:lnL>
+                      <a:noFill/>
+                    </a:lnL>
+                    <a:lnR w="12700" cap="flat" cmpd="sng" algn="ctr">
+                      <a:solidFill>
+                        <a:srgbClr val="000000"/>
+                      </a:solidFill>
+                      <a:prstDash val="solid"/>
+                      <a:round/>
+                      <a:headEnd type="none" w="med" len="med"/>
+                      <a:tailEnd type="none" w="med" len="med"/>
+                    </a:lnR>
+                    <a:lnT w="6350" cap="flat" cmpd="sng" algn="ctr">
+                      <a:solidFill>
+                        <a:srgbClr val="000000"/>
+                      </a:solidFill>
+                      <a:prstDash val="solid"/>
+                      <a:round/>
+                      <a:headEnd type="none" w="med" len="med"/>
+                      <a:tailEnd type="none" w="med" len="med"/>
+                    </a:lnT>
+                    <a:lnB w="6350" cap="flat" cmpd="sng" algn="ctr">
+                      <a:solidFill>
+                        <a:srgbClr val="000000"/>
+                      </a:solidFill>
+                      <a:prstDash val="solid"/>
+                      <a:round/>
+                      <a:headEnd type="none" w="med" len="med"/>
+                      <a:tailEnd type="none" w="med" len="med"/>
+                    </a:lnB>
+                  </a:tcPr>
+                </a:tc>
+              </a:tr>
+              <a:tr h="190500">
+                <a:tc>
+                  <a:txBody>
+                    <a:bodyPr/>
+                    <a:lstStyle/>
+                    <a:p>
+                      <a:pPr algn="r" fontAlgn="b"/>
+                      <a:r>
+                        <a:rPr lang="en-GB" sz="1100" b="0" i="0" u="none" strike="noStrike">
+                          <a:solidFill>
+                            <a:srgbClr val="000000"/>
+                          </a:solidFill>
+                          <a:effectLst/>
+                          <a:latin typeface="Arial" panose="020B0604020202020204" pitchFamily="34" charset="0"/>
+                        </a:rPr>
+                        <a:t>7</a:t>
+                      </a:r>
+                    </a:p>
+                  </a:txBody>
+                  <a:tcPr marL="9525" marR="9525" marT="9525" marB="0" anchor="b">
+                    <a:lnL w="12700" cap="flat" cmpd="sng" algn="ctr">
+                      <a:solidFill>
+                        <a:srgbClr val="000000"/>
+                      </a:solidFill>
+                      <a:prstDash val="solid"/>
+                      <a:round/>
+                      <a:headEnd type="none" w="med" len="med"/>
+                      <a:tailEnd type="none" w="med" len="med"/>
+                    </a:lnL>
+                    <a:lnR>
+                      <a:noFill/>
+                    </a:lnR>
+                    <a:lnT w="6350" cap="flat" cmpd="sng" algn="ctr">
+                      <a:solidFill>
+                        <a:srgbClr val="000000"/>
+                      </a:solidFill>
+                      <a:prstDash val="solid"/>
+                      <a:round/>
+                      <a:headEnd type="none" w="med" len="med"/>
+                      <a:tailEnd type="none" w="med" len="med"/>
+                    </a:lnT>
+                    <a:lnB w="6350" cap="flat" cmpd="sng" algn="ctr">
+                      <a:solidFill>
+                        <a:srgbClr val="000000"/>
+                      </a:solidFill>
+                      <a:prstDash val="solid"/>
+                      <a:round/>
+                      <a:headEnd type="none" w="med" len="med"/>
+                      <a:tailEnd type="none" w="med" len="med"/>
+                    </a:lnB>
+                  </a:tcPr>
+                </a:tc>
+                <a:tc>
+                  <a:txBody>
+                    <a:bodyPr/>
+                    <a:lstStyle/>
+                    <a:p>
+                      <a:pPr algn="ctr" fontAlgn="b"/>
+                      <a:r>
+                        <a:rPr lang="en-GB" sz="1100" b="0" i="0" u="none" strike="noStrike">
+                          <a:solidFill>
+                            <a:srgbClr val="000000"/>
+                          </a:solidFill>
+                          <a:effectLst/>
+                          <a:latin typeface="Arial" panose="020B0604020202020204" pitchFamily="34" charset="0"/>
+                        </a:rPr>
+                        <a:t> </a:t>
+                      </a:r>
+                    </a:p>
+                  </a:txBody>
+                  <a:tcPr marL="9525" marR="9525" marT="9525" marB="0" anchor="b">
+                    <a:lnL>
+                      <a:noFill/>
+                    </a:lnL>
+                    <a:lnR w="6350" cap="flat" cmpd="sng" algn="ctr">
+                      <a:solidFill>
+                        <a:srgbClr val="000000"/>
+                      </a:solidFill>
+                      <a:prstDash val="solid"/>
+                      <a:round/>
+                      <a:headEnd type="none" w="med" len="med"/>
+                      <a:tailEnd type="none" w="med" len="med"/>
+                    </a:lnR>
+                    <a:lnT w="6350" cap="flat" cmpd="sng" algn="ctr">
+                      <a:solidFill>
+                        <a:srgbClr val="000000"/>
+                      </a:solidFill>
+                      <a:prstDash val="solid"/>
+                      <a:round/>
+                      <a:headEnd type="none" w="med" len="med"/>
+                      <a:tailEnd type="none" w="med" len="med"/>
+                    </a:lnT>
+                    <a:lnB w="6350" cap="flat" cmpd="sng" algn="ctr">
+                      <a:solidFill>
+                        <a:srgbClr val="000000"/>
+                      </a:solidFill>
+                      <a:prstDash val="solid"/>
+                      <a:round/>
+                      <a:headEnd type="none" w="med" len="med"/>
+                      <a:tailEnd type="none" w="med" len="med"/>
+                    </a:lnB>
+                  </a:tcPr>
+                </a:tc>
+                <a:tc>
+                  <a:txBody>
+                    <a:bodyPr/>
+                    <a:lstStyle/>
+                    <a:p>
+                      <a:pPr algn="ctr" fontAlgn="b"/>
+                      <a:r>
+                        <a:rPr lang="en-GB" sz="1100" b="0" i="0" u="none" strike="noStrike">
+                          <a:solidFill>
+                            <a:srgbClr val="000000"/>
+                          </a:solidFill>
+                          <a:effectLst/>
+                          <a:latin typeface="Arial" panose="020B0604020202020204" pitchFamily="34" charset="0"/>
+                        </a:rPr>
+                        <a:t> </a:t>
+                      </a:r>
+                    </a:p>
+                  </a:txBody>
+                  <a:tcPr marL="9525" marR="9525" marT="9525" marB="0" anchor="b">
+                    <a:lnL w="6350" cap="flat" cmpd="sng" algn="ctr">
+                      <a:solidFill>
+                        <a:srgbClr val="000000"/>
+                      </a:solidFill>
+                      <a:prstDash val="solid"/>
+                      <a:round/>
+                      <a:headEnd type="none" w="med" len="med"/>
+                      <a:tailEnd type="none" w="med" len="med"/>
+                    </a:lnL>
+                    <a:lnR>
+                      <a:noFill/>
+                    </a:lnR>
+                    <a:lnT w="6350" cap="flat" cmpd="sng" algn="ctr">
+                      <a:solidFill>
+                        <a:srgbClr val="000000"/>
+                      </a:solidFill>
+                      <a:prstDash val="solid"/>
+                      <a:round/>
+                      <a:headEnd type="none" w="med" len="med"/>
+                      <a:tailEnd type="none" w="med" len="med"/>
+                    </a:lnT>
+                    <a:lnB w="6350" cap="flat" cmpd="sng" algn="ctr">
+                      <a:solidFill>
+                        <a:srgbClr val="000000"/>
+                      </a:solidFill>
+                      <a:prstDash val="solid"/>
+                      <a:round/>
+                      <a:headEnd type="none" w="med" len="med"/>
+                      <a:tailEnd type="none" w="med" len="med"/>
+                    </a:lnB>
+                  </a:tcPr>
+                </a:tc>
+                <a:tc>
+                  <a:txBody>
+                    <a:bodyPr/>
+                    <a:lstStyle/>
+                    <a:p>
+                      <a:pPr algn="l" fontAlgn="ctr"/>
+                      <a:r>
+                        <a:rPr lang="pt-BR" sz="1100" b="0" i="0" u="none" strike="noStrike">
+                          <a:solidFill>
+                            <a:srgbClr val="000000"/>
+                          </a:solidFill>
+                          <a:effectLst/>
+                          <a:latin typeface="Arial" panose="020B0604020202020204" pitchFamily="34" charset="0"/>
+                        </a:rPr>
+                        <a:t>A (15), B (15), C (15), 2.x2.05 (15), 3x1x1 (15)</a:t>
+                      </a:r>
+                    </a:p>
+                  </a:txBody>
+                  <a:tcPr marL="171450" marR="9525" marT="9525" marB="0" anchor="ctr">
+                    <a:lnL>
+                      <a:noFill/>
+                    </a:lnL>
+                    <a:lnR w="12700" cap="flat" cmpd="sng" algn="ctr">
+                      <a:solidFill>
+                        <a:srgbClr val="000000"/>
+                      </a:solidFill>
+                      <a:prstDash val="solid"/>
+                      <a:round/>
+                      <a:headEnd type="none" w="med" len="med"/>
+                      <a:tailEnd type="none" w="med" len="med"/>
+                    </a:lnR>
+                    <a:lnT w="6350" cap="flat" cmpd="sng" algn="ctr">
+                      <a:solidFill>
+                        <a:srgbClr val="000000"/>
+                      </a:solidFill>
+                      <a:prstDash val="solid"/>
+                      <a:round/>
+                      <a:headEnd type="none" w="med" len="med"/>
+                      <a:tailEnd type="none" w="med" len="med"/>
+                    </a:lnT>
+                    <a:lnB w="6350" cap="flat" cmpd="sng" algn="ctr">
+                      <a:solidFill>
+                        <a:srgbClr val="000000"/>
+                      </a:solidFill>
+                      <a:prstDash val="solid"/>
+                      <a:round/>
+                      <a:headEnd type="none" w="med" len="med"/>
+                      <a:tailEnd type="none" w="med" len="med"/>
+                    </a:lnB>
+                  </a:tcPr>
+                </a:tc>
+              </a:tr>
+              <a:tr h="200025">
+                <a:tc>
+                  <a:txBody>
+                    <a:bodyPr/>
+                    <a:lstStyle/>
+                    <a:p>
+                      <a:pPr algn="r" fontAlgn="b"/>
+                      <a:r>
+                        <a:rPr lang="en-GB" sz="1100" b="0" i="0" u="none" strike="noStrike">
+                          <a:solidFill>
+                            <a:srgbClr val="000000"/>
+                          </a:solidFill>
+                          <a:effectLst/>
+                          <a:latin typeface="Arial" panose="020B0604020202020204" pitchFamily="34" charset="0"/>
+                        </a:rPr>
+                        <a:t>8</a:t>
+                      </a:r>
+                    </a:p>
+                  </a:txBody>
+                  <a:tcPr marL="9525" marR="9525" marT="9525" marB="0" anchor="b">
+                    <a:lnL w="12700" cap="flat" cmpd="sng" algn="ctr">
+                      <a:solidFill>
+                        <a:srgbClr val="000000"/>
+                      </a:solidFill>
+                      <a:prstDash val="solid"/>
+                      <a:round/>
+                      <a:headEnd type="none" w="med" len="med"/>
+                      <a:tailEnd type="none" w="med" len="med"/>
+                    </a:lnL>
+                    <a:lnR>
+                      <a:noFill/>
+                    </a:lnR>
+                    <a:lnT w="6350" cap="flat" cmpd="sng" algn="ctr">
+                      <a:solidFill>
+                        <a:srgbClr val="000000"/>
+                      </a:solidFill>
+                      <a:prstDash val="solid"/>
+                      <a:round/>
+                      <a:headEnd type="none" w="med" len="med"/>
+                      <a:tailEnd type="none" w="med" len="med"/>
+                    </a:lnT>
+                    <a:lnB w="6350" cap="flat" cmpd="sng" algn="ctr">
+                      <a:solidFill>
+                        <a:srgbClr val="000000"/>
+                      </a:solidFill>
+                      <a:prstDash val="solid"/>
+                      <a:round/>
+                      <a:headEnd type="none" w="med" len="med"/>
+                      <a:tailEnd type="none" w="med" len="med"/>
+                    </a:lnB>
+                  </a:tcPr>
+                </a:tc>
+                <a:tc>
+                  <a:txBody>
+                    <a:bodyPr/>
+                    <a:lstStyle/>
+                    <a:p>
+                      <a:pPr algn="ctr" fontAlgn="b"/>
+                      <a:r>
+                        <a:rPr lang="en-GB" sz="1100" b="0" i="0" u="none" strike="noStrike">
+                          <a:solidFill>
+                            <a:srgbClr val="000000"/>
+                          </a:solidFill>
+                          <a:effectLst/>
+                          <a:latin typeface="Arial" panose="020B0604020202020204" pitchFamily="34" charset="0"/>
+                        </a:rPr>
+                        <a:t> </a:t>
+                      </a:r>
+                    </a:p>
+                  </a:txBody>
+                  <a:tcPr marL="9525" marR="9525" marT="9525" marB="0" anchor="b">
+                    <a:lnL>
+                      <a:noFill/>
+                    </a:lnL>
+                    <a:lnR w="6350" cap="flat" cmpd="sng" algn="ctr">
+                      <a:solidFill>
+                        <a:srgbClr val="000000"/>
+                      </a:solidFill>
+                      <a:prstDash val="solid"/>
+                      <a:round/>
+                      <a:headEnd type="none" w="med" len="med"/>
+                      <a:tailEnd type="none" w="med" len="med"/>
+                    </a:lnR>
+                    <a:lnT w="6350" cap="flat" cmpd="sng" algn="ctr">
+                      <a:solidFill>
+                        <a:srgbClr val="000000"/>
+                      </a:solidFill>
+                      <a:prstDash val="solid"/>
+                      <a:round/>
+                      <a:headEnd type="none" w="med" len="med"/>
+                      <a:tailEnd type="none" w="med" len="med"/>
+                    </a:lnT>
+                    <a:lnB w="6350" cap="flat" cmpd="sng" algn="ctr">
+                      <a:solidFill>
+                        <a:srgbClr val="000000"/>
+                      </a:solidFill>
+                      <a:prstDash val="solid"/>
+                      <a:round/>
+                      <a:headEnd type="none" w="med" len="med"/>
+                      <a:tailEnd type="none" w="med" len="med"/>
+                    </a:lnB>
+                  </a:tcPr>
+                </a:tc>
+                <a:tc>
+                  <a:txBody>
+                    <a:bodyPr/>
+                    <a:lstStyle/>
+                    <a:p>
+                      <a:pPr algn="ctr" fontAlgn="b"/>
+                      <a:r>
+                        <a:rPr lang="en-GB" sz="1100" b="0" i="0" u="none" strike="noStrike">
+                          <a:solidFill>
+                            <a:srgbClr val="000000"/>
+                          </a:solidFill>
+                          <a:effectLst/>
+                          <a:latin typeface="Arial" panose="020B0604020202020204" pitchFamily="34" charset="0"/>
+                        </a:rPr>
+                        <a:t> </a:t>
+                      </a:r>
+                    </a:p>
+                  </a:txBody>
+                  <a:tcPr marL="9525" marR="9525" marT="9525" marB="0" anchor="b">
+                    <a:lnL w="6350" cap="flat" cmpd="sng" algn="ctr">
+                      <a:solidFill>
+                        <a:srgbClr val="000000"/>
+                      </a:solidFill>
+                      <a:prstDash val="solid"/>
+                      <a:round/>
+                      <a:headEnd type="none" w="med" len="med"/>
+                      <a:tailEnd type="none" w="med" len="med"/>
+                    </a:lnL>
+                    <a:lnR>
+                      <a:noFill/>
+                    </a:lnR>
+                    <a:lnT w="6350" cap="flat" cmpd="sng" algn="ctr">
+                      <a:solidFill>
+                        <a:srgbClr val="000000"/>
+                      </a:solidFill>
+                      <a:prstDash val="solid"/>
+                      <a:round/>
+                      <a:headEnd type="none" w="med" len="med"/>
+                      <a:tailEnd type="none" w="med" len="med"/>
+                    </a:lnT>
+                    <a:lnB w="6350" cap="flat" cmpd="sng" algn="ctr">
+                      <a:solidFill>
+                        <a:srgbClr val="000000"/>
+                      </a:solidFill>
+                      <a:prstDash val="solid"/>
+                      <a:round/>
+                      <a:headEnd type="none" w="med" len="med"/>
+                      <a:tailEnd type="none" w="med" len="med"/>
+                    </a:lnB>
+                  </a:tcPr>
+                </a:tc>
+                <a:tc>
+                  <a:txBody>
+                    <a:bodyPr/>
+                    <a:lstStyle/>
+                    <a:p>
+                      <a:pPr algn="l" fontAlgn="ctr"/>
+                      <a:r>
+                        <a:rPr lang="pt-BR" sz="1100" b="0" i="0" u="none" strike="noStrike">
+                          <a:solidFill>
+                            <a:srgbClr val="000000"/>
+                          </a:solidFill>
+                          <a:effectLst/>
+                          <a:latin typeface="Arial" panose="020B0604020202020204" pitchFamily="34" charset="0"/>
+                        </a:rPr>
+                        <a:t>A (10), B (10), C (10), 2.x2.05 (10), 3x1x1 (10), 2.5x1x1.5 (10)</a:t>
+                      </a:r>
+                    </a:p>
+                  </a:txBody>
+                  <a:tcPr marL="171450" marR="9525" marT="9525" marB="0" anchor="ctr">
+                    <a:lnL>
+                      <a:noFill/>
+                    </a:lnL>
+                    <a:lnR w="12700" cap="flat" cmpd="sng" algn="ctr">
+                      <a:solidFill>
+                        <a:srgbClr val="000000"/>
+                      </a:solidFill>
+                      <a:prstDash val="solid"/>
+                      <a:round/>
+                      <a:headEnd type="none" w="med" len="med"/>
+                      <a:tailEnd type="none" w="med" len="med"/>
+                    </a:lnR>
+                    <a:lnT w="6350" cap="flat" cmpd="sng" algn="ctr">
+                      <a:solidFill>
+                        <a:srgbClr val="000000"/>
+                      </a:solidFill>
+                      <a:prstDash val="solid"/>
+                      <a:round/>
+                      <a:headEnd type="none" w="med" len="med"/>
+                      <a:tailEnd type="none" w="med" len="med"/>
+                    </a:lnT>
+                    <a:lnB w="6350" cap="flat" cmpd="sng" algn="ctr">
+                      <a:solidFill>
+                        <a:srgbClr val="000000"/>
+                      </a:solidFill>
+                      <a:prstDash val="solid"/>
+                      <a:round/>
+                      <a:headEnd type="none" w="med" len="med"/>
+                      <a:tailEnd type="none" w="med" len="med"/>
+                    </a:lnB>
+                  </a:tcPr>
+                </a:tc>
+              </a:tr>
+              <a:tr h="190500">
+                <a:tc>
+                  <a:txBody>
+                    <a:bodyPr/>
+                    <a:lstStyle/>
+                    <a:p>
+                      <a:pPr algn="r" fontAlgn="b"/>
+                      <a:r>
+                        <a:rPr lang="en-GB" sz="1100" b="0" i="0" u="none" strike="noStrike">
+                          <a:solidFill>
+                            <a:srgbClr val="000000"/>
+                          </a:solidFill>
+                          <a:effectLst/>
+                          <a:latin typeface="Arial" panose="020B0604020202020204" pitchFamily="34" charset="0"/>
+                        </a:rPr>
+                        <a:t>9</a:t>
+                      </a:r>
+                    </a:p>
+                  </a:txBody>
+                  <a:tcPr marL="9525" marR="9525" marT="9525" marB="0" anchor="b">
+                    <a:lnL w="12700" cap="flat" cmpd="sng" algn="ctr">
+                      <a:solidFill>
+                        <a:srgbClr val="000000"/>
+                      </a:solidFill>
+                      <a:prstDash val="solid"/>
+                      <a:round/>
+                      <a:headEnd type="none" w="med" len="med"/>
+                      <a:tailEnd type="none" w="med" len="med"/>
+                    </a:lnL>
+                    <a:lnR>
+                      <a:noFill/>
+                    </a:lnR>
+                    <a:lnT w="6350" cap="flat" cmpd="sng" algn="ctr">
+                      <a:solidFill>
+                        <a:srgbClr val="000000"/>
+                      </a:solidFill>
+                      <a:prstDash val="solid"/>
+                      <a:round/>
+                      <a:headEnd type="none" w="med" len="med"/>
+                      <a:tailEnd type="none" w="med" len="med"/>
+                    </a:lnT>
+                    <a:lnB w="6350" cap="flat" cmpd="sng" algn="ctr">
+                      <a:solidFill>
+                        <a:srgbClr val="000000"/>
+                      </a:solidFill>
+                      <a:prstDash val="solid"/>
+                      <a:round/>
+                      <a:headEnd type="none" w="med" len="med"/>
+                      <a:tailEnd type="none" w="med" len="med"/>
+                    </a:lnB>
+                  </a:tcPr>
+                </a:tc>
+                <a:tc>
+                  <a:txBody>
+                    <a:bodyPr/>
+                    <a:lstStyle/>
+                    <a:p>
+                      <a:pPr algn="ctr" fontAlgn="b"/>
+                      <a:r>
+                        <a:rPr lang="en-GB" sz="1100" b="0" i="0" u="none" strike="noStrike">
+                          <a:solidFill>
+                            <a:srgbClr val="000000"/>
+                          </a:solidFill>
+                          <a:effectLst/>
+                          <a:latin typeface="Arial" panose="020B0604020202020204" pitchFamily="34" charset="0"/>
+                        </a:rPr>
+                        <a:t> </a:t>
+                      </a:r>
+                    </a:p>
+                  </a:txBody>
+                  <a:tcPr marL="9525" marR="9525" marT="9525" marB="0" anchor="b">
+                    <a:lnL>
+                      <a:noFill/>
+                    </a:lnL>
+                    <a:lnR w="6350" cap="flat" cmpd="sng" algn="ctr">
+                      <a:solidFill>
+                        <a:srgbClr val="000000"/>
+                      </a:solidFill>
+                      <a:prstDash val="solid"/>
+                      <a:round/>
+                      <a:headEnd type="none" w="med" len="med"/>
+                      <a:tailEnd type="none" w="med" len="med"/>
+                    </a:lnR>
+                    <a:lnT w="6350" cap="flat" cmpd="sng" algn="ctr">
+                      <a:solidFill>
+                        <a:srgbClr val="000000"/>
+                      </a:solidFill>
+                      <a:prstDash val="solid"/>
+                      <a:round/>
+                      <a:headEnd type="none" w="med" len="med"/>
+                      <a:tailEnd type="none" w="med" len="med"/>
+                    </a:lnT>
+                    <a:lnB w="6350" cap="flat" cmpd="sng" algn="ctr">
+                      <a:solidFill>
+                        <a:srgbClr val="000000"/>
+                      </a:solidFill>
+                      <a:prstDash val="solid"/>
+                      <a:round/>
+                      <a:headEnd type="none" w="med" len="med"/>
+                      <a:tailEnd type="none" w="med" len="med"/>
+                    </a:lnB>
+                  </a:tcPr>
+                </a:tc>
+                <a:tc>
+                  <a:txBody>
+                    <a:bodyPr/>
+                    <a:lstStyle/>
+                    <a:p>
+                      <a:pPr algn="ctr" fontAlgn="b"/>
+                      <a:r>
+                        <a:rPr lang="en-GB" sz="1100" b="0" i="0" u="none" strike="noStrike">
+                          <a:solidFill>
+                            <a:srgbClr val="000000"/>
+                          </a:solidFill>
+                          <a:effectLst/>
+                          <a:latin typeface="Arial" panose="020B0604020202020204" pitchFamily="34" charset="0"/>
+                        </a:rPr>
+                        <a:t> </a:t>
+                      </a:r>
+                    </a:p>
+                  </a:txBody>
+                  <a:tcPr marL="9525" marR="9525" marT="9525" marB="0" anchor="b">
+                    <a:lnL w="6350" cap="flat" cmpd="sng" algn="ctr">
+                      <a:solidFill>
+                        <a:srgbClr val="000000"/>
+                      </a:solidFill>
+                      <a:prstDash val="solid"/>
+                      <a:round/>
+                      <a:headEnd type="none" w="med" len="med"/>
+                      <a:tailEnd type="none" w="med" len="med"/>
+                    </a:lnL>
+                    <a:lnR>
+                      <a:noFill/>
+                    </a:lnR>
+                    <a:lnT w="6350" cap="flat" cmpd="sng" algn="ctr">
+                      <a:solidFill>
+                        <a:srgbClr val="000000"/>
+                      </a:solidFill>
+                      <a:prstDash val="solid"/>
+                      <a:round/>
+                      <a:headEnd type="none" w="med" len="med"/>
+                      <a:tailEnd type="none" w="med" len="med"/>
+                    </a:lnT>
+                    <a:lnB w="6350" cap="flat" cmpd="sng" algn="ctr">
+                      <a:solidFill>
+                        <a:srgbClr val="000000"/>
+                      </a:solidFill>
+                      <a:prstDash val="solid"/>
+                      <a:round/>
+                      <a:headEnd type="none" w="med" len="med"/>
+                      <a:tailEnd type="none" w="med" len="med"/>
+                    </a:lnB>
+                  </a:tcPr>
+                </a:tc>
+                <a:tc>
+                  <a:txBody>
+                    <a:bodyPr/>
+                    <a:lstStyle/>
+                    <a:p>
+                      <a:pPr algn="l" fontAlgn="ctr"/>
+                      <a:r>
+                        <a:rPr lang="pt-BR" sz="1100" b="0" i="0" u="none" strike="noStrike">
+                          <a:solidFill>
+                            <a:srgbClr val="000000"/>
+                          </a:solidFill>
+                          <a:effectLst/>
+                          <a:latin typeface="Arial" panose="020B0604020202020204" pitchFamily="34" charset="0"/>
+                        </a:rPr>
+                        <a:t>A (83), B (55), C (50), 2.x2.05 (83)</a:t>
+                      </a:r>
+                    </a:p>
+                  </a:txBody>
+                  <a:tcPr marL="171450" marR="9525" marT="9525" marB="0" anchor="ctr">
+                    <a:lnL>
+                      <a:noFill/>
+                    </a:lnL>
+                    <a:lnR w="12700" cap="flat" cmpd="sng" algn="ctr">
+                      <a:solidFill>
+                        <a:srgbClr val="000000"/>
+                      </a:solidFill>
+                      <a:prstDash val="solid"/>
+                      <a:round/>
+                      <a:headEnd type="none" w="med" len="med"/>
+                      <a:tailEnd type="none" w="med" len="med"/>
+                    </a:lnR>
+                    <a:lnT w="6350" cap="flat" cmpd="sng" algn="ctr">
+                      <a:solidFill>
+                        <a:srgbClr val="000000"/>
+                      </a:solidFill>
+                      <a:prstDash val="solid"/>
+                      <a:round/>
+                      <a:headEnd type="none" w="med" len="med"/>
+                      <a:tailEnd type="none" w="med" len="med"/>
+                    </a:lnT>
+                    <a:lnB w="6350" cap="flat" cmpd="sng" algn="ctr">
+                      <a:solidFill>
+                        <a:srgbClr val="000000"/>
+                      </a:solidFill>
+                      <a:prstDash val="solid"/>
+                      <a:round/>
+                      <a:headEnd type="none" w="med" len="med"/>
+                      <a:tailEnd type="none" w="med" len="med"/>
+                    </a:lnB>
+                  </a:tcPr>
+                </a:tc>
+              </a:tr>
+              <a:tr h="190500">
+                <a:tc>
+                  <a:txBody>
+                    <a:bodyPr/>
+                    <a:lstStyle/>
+                    <a:p>
+                      <a:pPr algn="r" fontAlgn="b"/>
+                      <a:r>
+                        <a:rPr lang="en-GB" sz="1100" b="0" i="0" u="none" strike="noStrike">
+                          <a:solidFill>
+                            <a:srgbClr val="000000"/>
+                          </a:solidFill>
+                          <a:effectLst/>
+                          <a:latin typeface="Arial" panose="020B0604020202020204" pitchFamily="34" charset="0"/>
+                        </a:rPr>
+                        <a:t>10</a:t>
+                      </a:r>
+                    </a:p>
+                  </a:txBody>
+                  <a:tcPr marL="9525" marR="9525" marT="9525" marB="0" anchor="b">
+                    <a:lnL w="12700" cap="flat" cmpd="sng" algn="ctr">
+                      <a:solidFill>
+                        <a:srgbClr val="000000"/>
+                      </a:solidFill>
+                      <a:prstDash val="solid"/>
+                      <a:round/>
+                      <a:headEnd type="none" w="med" len="med"/>
+                      <a:tailEnd type="none" w="med" len="med"/>
+                    </a:lnL>
+                    <a:lnR>
+                      <a:noFill/>
+                    </a:lnR>
+                    <a:lnT w="6350" cap="flat" cmpd="sng" algn="ctr">
+                      <a:solidFill>
+                        <a:srgbClr val="000000"/>
+                      </a:solidFill>
+                      <a:prstDash val="solid"/>
+                      <a:round/>
+                      <a:headEnd type="none" w="med" len="med"/>
+                      <a:tailEnd type="none" w="med" len="med"/>
+                    </a:lnT>
+                    <a:lnB w="6350" cap="flat" cmpd="sng" algn="ctr">
+                      <a:solidFill>
+                        <a:srgbClr val="000000"/>
+                      </a:solidFill>
+                      <a:prstDash val="solid"/>
+                      <a:round/>
+                      <a:headEnd type="none" w="med" len="med"/>
+                      <a:tailEnd type="none" w="med" len="med"/>
+                    </a:lnB>
+                  </a:tcPr>
+                </a:tc>
+                <a:tc>
+                  <a:txBody>
+                    <a:bodyPr/>
+                    <a:lstStyle/>
+                    <a:p>
+                      <a:pPr algn="ctr" fontAlgn="b"/>
+                      <a:r>
+                        <a:rPr lang="en-GB" sz="1100" b="0" i="0" u="none" strike="noStrike">
+                          <a:solidFill>
+                            <a:srgbClr val="000000"/>
+                          </a:solidFill>
+                          <a:effectLst/>
+                          <a:latin typeface="Arial" panose="020B0604020202020204" pitchFamily="34" charset="0"/>
+                        </a:rPr>
+                        <a:t> </a:t>
+                      </a:r>
+                    </a:p>
+                  </a:txBody>
+                  <a:tcPr marL="9525" marR="9525" marT="9525" marB="0" anchor="b">
+                    <a:lnL>
+                      <a:noFill/>
+                    </a:lnL>
+                    <a:lnR w="6350" cap="flat" cmpd="sng" algn="ctr">
+                      <a:solidFill>
+                        <a:srgbClr val="000000"/>
+                      </a:solidFill>
+                      <a:prstDash val="solid"/>
+                      <a:round/>
+                      <a:headEnd type="none" w="med" len="med"/>
+                      <a:tailEnd type="none" w="med" len="med"/>
+                    </a:lnR>
+                    <a:lnT w="6350" cap="flat" cmpd="sng" algn="ctr">
+                      <a:solidFill>
+                        <a:srgbClr val="000000"/>
+                      </a:solidFill>
+                      <a:prstDash val="solid"/>
+                      <a:round/>
+                      <a:headEnd type="none" w="med" len="med"/>
+                      <a:tailEnd type="none" w="med" len="med"/>
+                    </a:lnT>
+                    <a:lnB w="6350" cap="flat" cmpd="sng" algn="ctr">
+                      <a:solidFill>
+                        <a:srgbClr val="000000"/>
+                      </a:solidFill>
+                      <a:prstDash val="solid"/>
+                      <a:round/>
+                      <a:headEnd type="none" w="med" len="med"/>
+                      <a:tailEnd type="none" w="med" len="med"/>
+                    </a:lnB>
+                  </a:tcPr>
+                </a:tc>
+                <a:tc>
+                  <a:txBody>
+                    <a:bodyPr/>
+                    <a:lstStyle/>
+                    <a:p>
+                      <a:pPr algn="ctr" fontAlgn="b"/>
+                      <a:r>
+                        <a:rPr lang="en-GB" sz="1100" b="0" i="0" u="none" strike="noStrike">
+                          <a:solidFill>
+                            <a:srgbClr val="000000"/>
+                          </a:solidFill>
+                          <a:effectLst/>
+                          <a:latin typeface="Arial" panose="020B0604020202020204" pitchFamily="34" charset="0"/>
+                        </a:rPr>
+                        <a:t> </a:t>
+                      </a:r>
+                    </a:p>
+                  </a:txBody>
+                  <a:tcPr marL="9525" marR="9525" marT="9525" marB="0" anchor="b">
+                    <a:lnL w="6350" cap="flat" cmpd="sng" algn="ctr">
+                      <a:solidFill>
+                        <a:srgbClr val="000000"/>
+                      </a:solidFill>
+                      <a:prstDash val="solid"/>
+                      <a:round/>
+                      <a:headEnd type="none" w="med" len="med"/>
+                      <a:tailEnd type="none" w="med" len="med"/>
+                    </a:lnL>
+                    <a:lnR>
+                      <a:noFill/>
+                    </a:lnR>
+                    <a:lnT w="6350" cap="flat" cmpd="sng" algn="ctr">
+                      <a:solidFill>
+                        <a:srgbClr val="000000"/>
+                      </a:solidFill>
+                      <a:prstDash val="solid"/>
+                      <a:round/>
+                      <a:headEnd type="none" w="med" len="med"/>
+                      <a:tailEnd type="none" w="med" len="med"/>
+                    </a:lnT>
+                    <a:lnB w="6350" cap="flat" cmpd="sng" algn="ctr">
+                      <a:solidFill>
+                        <a:srgbClr val="000000"/>
+                      </a:solidFill>
+                      <a:prstDash val="solid"/>
+                      <a:round/>
+                      <a:headEnd type="none" w="med" len="med"/>
+                      <a:tailEnd type="none" w="med" len="med"/>
+                    </a:lnB>
+                  </a:tcPr>
+                </a:tc>
+                <a:tc>
+                  <a:txBody>
+                    <a:bodyPr/>
+                    <a:lstStyle/>
+                    <a:p>
+                      <a:pPr algn="l" fontAlgn="ctr"/>
+                      <a:r>
+                        <a:rPr lang="pt-BR" sz="1100" b="0" i="0" u="none" strike="noStrike">
+                          <a:solidFill>
+                            <a:srgbClr val="000000"/>
+                          </a:solidFill>
+                          <a:effectLst/>
+                          <a:latin typeface="Arial" panose="020B0604020202020204" pitchFamily="34" charset="0"/>
+                        </a:rPr>
+                        <a:t>A (83), B (55), C (50), 2.x2.05 (83), 3x1x1 (55)</a:t>
+                      </a:r>
+                    </a:p>
+                  </a:txBody>
+                  <a:tcPr marL="171450" marR="9525" marT="9525" marB="0" anchor="ctr">
+                    <a:lnL>
+                      <a:noFill/>
+                    </a:lnL>
+                    <a:lnR w="12700" cap="flat" cmpd="sng" algn="ctr">
+                      <a:solidFill>
+                        <a:srgbClr val="000000"/>
+                      </a:solidFill>
+                      <a:prstDash val="solid"/>
+                      <a:round/>
+                      <a:headEnd type="none" w="med" len="med"/>
+                      <a:tailEnd type="none" w="med" len="med"/>
+                    </a:lnR>
+                    <a:lnT w="6350" cap="flat" cmpd="sng" algn="ctr">
+                      <a:solidFill>
+                        <a:srgbClr val="000000"/>
+                      </a:solidFill>
+                      <a:prstDash val="solid"/>
+                      <a:round/>
+                      <a:headEnd type="none" w="med" len="med"/>
+                      <a:tailEnd type="none" w="med" len="med"/>
+                    </a:lnT>
+                    <a:lnB w="6350" cap="flat" cmpd="sng" algn="ctr">
+                      <a:solidFill>
+                        <a:srgbClr val="000000"/>
+                      </a:solidFill>
+                      <a:prstDash val="solid"/>
+                      <a:round/>
+                      <a:headEnd type="none" w="med" len="med"/>
+                      <a:tailEnd type="none" w="med" len="med"/>
+                    </a:lnB>
+                  </a:tcPr>
+                </a:tc>
+              </a:tr>
+              <a:tr h="200025">
+                <a:tc>
+                  <a:txBody>
+                    <a:bodyPr/>
+                    <a:lstStyle/>
+                    <a:p>
+                      <a:pPr algn="r" fontAlgn="b"/>
+                      <a:r>
+                        <a:rPr lang="en-GB" sz="1100" b="0" i="0" u="none" strike="noStrike">
+                          <a:solidFill>
+                            <a:srgbClr val="000000"/>
+                          </a:solidFill>
+                          <a:effectLst/>
+                          <a:latin typeface="Arial" panose="020B0604020202020204" pitchFamily="34" charset="0"/>
+                        </a:rPr>
+                        <a:t>11</a:t>
+                      </a:r>
+                    </a:p>
+                  </a:txBody>
+                  <a:tcPr marL="9525" marR="9525" marT="9525" marB="0" anchor="b">
+                    <a:lnL w="12700" cap="flat" cmpd="sng" algn="ctr">
+                      <a:solidFill>
+                        <a:srgbClr val="000000"/>
+                      </a:solidFill>
+                      <a:prstDash val="solid"/>
+                      <a:round/>
+                      <a:headEnd type="none" w="med" len="med"/>
+                      <a:tailEnd type="none" w="med" len="med"/>
+                    </a:lnL>
+                    <a:lnR>
+                      <a:noFill/>
+                    </a:lnR>
+                    <a:lnT w="6350" cap="flat" cmpd="sng" algn="ctr">
+                      <a:solidFill>
+                        <a:srgbClr val="000000"/>
+                      </a:solidFill>
+                      <a:prstDash val="solid"/>
+                      <a:round/>
+                      <a:headEnd type="none" w="med" len="med"/>
+                      <a:tailEnd type="none" w="med" len="med"/>
+                    </a:lnT>
+                    <a:lnB w="12700" cap="flat" cmpd="sng" algn="ctr">
+                      <a:solidFill>
+                        <a:srgbClr val="000000"/>
+                      </a:solidFill>
+                      <a:prstDash val="solid"/>
+                      <a:round/>
+                      <a:headEnd type="none" w="med" len="med"/>
+                      <a:tailEnd type="none" w="med" len="med"/>
+                    </a:lnB>
+                  </a:tcPr>
+                </a:tc>
+                <a:tc>
+                  <a:txBody>
+                    <a:bodyPr/>
+                    <a:lstStyle/>
+                    <a:p>
+                      <a:pPr algn="ctr" fontAlgn="b"/>
+                      <a:r>
+                        <a:rPr lang="en-GB" sz="1100" b="0" i="0" u="none" strike="noStrike">
+                          <a:solidFill>
+                            <a:srgbClr val="000000"/>
+                          </a:solidFill>
+                          <a:effectLst/>
+                          <a:latin typeface="Arial" panose="020B0604020202020204" pitchFamily="34" charset="0"/>
+                        </a:rPr>
+                        <a:t> </a:t>
+                      </a:r>
+                    </a:p>
+                  </a:txBody>
+                  <a:tcPr marL="9525" marR="9525" marT="9525" marB="0" anchor="b">
+                    <a:lnL>
+                      <a:noFill/>
+                    </a:lnL>
+                    <a:lnR w="6350" cap="flat" cmpd="sng" algn="ctr">
+                      <a:solidFill>
+                        <a:srgbClr val="000000"/>
+                      </a:solidFill>
+                      <a:prstDash val="solid"/>
+                      <a:round/>
+                      <a:headEnd type="none" w="med" len="med"/>
+                      <a:tailEnd type="none" w="med" len="med"/>
+                    </a:lnR>
+                    <a:lnT w="6350" cap="flat" cmpd="sng" algn="ctr">
+                      <a:solidFill>
+                        <a:srgbClr val="000000"/>
+                      </a:solidFill>
+                      <a:prstDash val="solid"/>
+                      <a:round/>
+                      <a:headEnd type="none" w="med" len="med"/>
+                      <a:tailEnd type="none" w="med" len="med"/>
+                    </a:lnT>
+                    <a:lnB w="12700" cap="flat" cmpd="sng" algn="ctr">
+                      <a:solidFill>
+                        <a:srgbClr val="000000"/>
+                      </a:solidFill>
+                      <a:prstDash val="solid"/>
+                      <a:round/>
+                      <a:headEnd type="none" w="med" len="med"/>
+                      <a:tailEnd type="none" w="med" len="med"/>
+                    </a:lnB>
+                  </a:tcPr>
+                </a:tc>
+                <a:tc>
+                  <a:txBody>
+                    <a:bodyPr/>
+                    <a:lstStyle/>
+                    <a:p>
+                      <a:pPr algn="ctr" fontAlgn="b"/>
+                      <a:r>
+                        <a:rPr lang="en-GB" sz="1100" b="0" i="0" u="none" strike="noStrike">
+                          <a:solidFill>
+                            <a:srgbClr val="000000"/>
+                          </a:solidFill>
+                          <a:effectLst/>
+                          <a:latin typeface="Arial" panose="020B0604020202020204" pitchFamily="34" charset="0"/>
+                        </a:rPr>
+                        <a:t> </a:t>
+                      </a:r>
+                    </a:p>
+                  </a:txBody>
+                  <a:tcPr marL="9525" marR="9525" marT="9525" marB="0" anchor="b">
+                    <a:lnL w="6350" cap="flat" cmpd="sng" algn="ctr">
+                      <a:solidFill>
+                        <a:srgbClr val="000000"/>
+                      </a:solidFill>
+                      <a:prstDash val="solid"/>
+                      <a:round/>
+                      <a:headEnd type="none" w="med" len="med"/>
+                      <a:tailEnd type="none" w="med" len="med"/>
+                    </a:lnL>
+                    <a:lnR>
+                      <a:noFill/>
+                    </a:lnR>
+                    <a:lnT w="6350" cap="flat" cmpd="sng" algn="ctr">
+                      <a:solidFill>
+                        <a:srgbClr val="000000"/>
+                      </a:solidFill>
+                      <a:prstDash val="solid"/>
+                      <a:round/>
+                      <a:headEnd type="none" w="med" len="med"/>
+                      <a:tailEnd type="none" w="med" len="med"/>
+                    </a:lnT>
+                    <a:lnB w="12700" cap="flat" cmpd="sng" algn="ctr">
+                      <a:solidFill>
+                        <a:srgbClr val="000000"/>
+                      </a:solidFill>
+                      <a:prstDash val="solid"/>
+                      <a:round/>
+                      <a:headEnd type="none" w="med" len="med"/>
+                      <a:tailEnd type="none" w="med" len="med"/>
+                    </a:lnB>
+                  </a:tcPr>
+                </a:tc>
+                <a:tc>
+                  <a:txBody>
+                    <a:bodyPr/>
+                    <a:lstStyle/>
+                    <a:p>
+                      <a:pPr algn="l" fontAlgn="ctr"/>
+                      <a:r>
+                        <a:rPr lang="pt-BR" sz="1100" b="0" i="0" u="none" strike="noStrike" dirty="0">
+                          <a:solidFill>
+                            <a:srgbClr val="000000"/>
+                          </a:solidFill>
+                          <a:effectLst/>
+                          <a:latin typeface="Arial" panose="020B0604020202020204" pitchFamily="34" charset="0"/>
+                        </a:rPr>
+                        <a:t>A (83), B (55), C (50), 2.x2.05 (83), 3x1x1 (55), 2.5x1x1.5 (44)</a:t>
+                      </a:r>
+                    </a:p>
+                  </a:txBody>
+                  <a:tcPr marL="171450" marR="9525" marT="9525" marB="0" anchor="ctr">
+                    <a:lnL>
+                      <a:noFill/>
+                    </a:lnL>
+                    <a:lnR w="12700" cap="flat" cmpd="sng" algn="ctr">
+                      <a:solidFill>
+                        <a:srgbClr val="000000"/>
+                      </a:solidFill>
+                      <a:prstDash val="solid"/>
+                      <a:round/>
+                      <a:headEnd type="none" w="med" len="med"/>
+                      <a:tailEnd type="none" w="med" len="med"/>
+                    </a:lnR>
+                    <a:lnT w="6350" cap="flat" cmpd="sng" algn="ctr">
+                      <a:solidFill>
+                        <a:srgbClr val="000000"/>
+                      </a:solidFill>
+                      <a:prstDash val="solid"/>
+                      <a:round/>
+                      <a:headEnd type="none" w="med" len="med"/>
+                      <a:tailEnd type="none" w="med" len="med"/>
+                    </a:lnT>
+                    <a:lnB w="12700" cap="flat" cmpd="sng" algn="ctr">
+                      <a:solidFill>
+                        <a:srgbClr val="000000"/>
+                      </a:solidFill>
+                      <a:prstDash val="solid"/>
+                      <a:round/>
+                      <a:headEnd type="none" w="med" len="med"/>
+                      <a:tailEnd type="none" w="med" len="med"/>
+                    </a:lnB>
+                  </a:tcPr>
+                </a:tc>
+              </a:tr>
+            </a:tbl>
+          </a:graphicData>
+        </a:graphic>
+      </p:graphicFrame>
+    </p:spTree>
+    <p:extLst>
+      <p:ext uri="{BB962C8B-B14F-4D97-AF65-F5344CB8AC3E}">
+        <p14:creationId xmlns:p14="http://schemas.microsoft.com/office/powerpoint/2010/main" val="3915436884"/>
       </p:ext>
     </p:extLst>
   </p:cSld>

</xml_diff>